<commit_message>
adding work on thesis
</commit_message>
<xml_diff>
--- a/Research Design & Proposal Writting/Assignment 1/c15311966_first_assignment.pptx
+++ b/Research Design & Proposal Writting/Assignment 1/c15311966_first_assignment.pptx
@@ -4103,7 +4103,7 @@
         </p:nvSpPr>
         <p:spPr>
           <a:xfrm>
-            <a:off x="1069848" y="484633"/>
+            <a:off x="1066800" y="280737"/>
             <a:ext cx="10058400" cy="782693"/>
           </a:xfrm>
         </p:spPr>
@@ -4140,70 +4140,109 @@
         </p:nvSpPr>
         <p:spPr>
           <a:xfrm>
-            <a:off x="641684" y="1267326"/>
-            <a:ext cx="11197390" cy="5309937"/>
+            <a:off x="211015" y="1063430"/>
+            <a:ext cx="11711354" cy="5639520"/>
           </a:xfrm>
         </p:spPr>
         <p:txBody>
           <a:bodyPr>
-            <a:normAutofit fontScale="92500" lnSpcReduction="20000"/>
+            <a:normAutofit lnSpcReduction="10000"/>
           </a:bodyPr>
           <a:lstStyle/>
           <a:p>
             <a:r>
-              <a:rPr lang="en-US" dirty="0"/>
-              <a:t>Computing Methodologies =&gt; Machine Leaning =&gt; Machine Learning Approaches = &gt; Learning Linear Models </a:t>
-            </a:r>
-          </a:p>
-          <a:p>
-            <a:r>
-              <a:rPr lang="en-US" dirty="0"/>
+              <a:rPr lang="en-US" dirty="0">
+                <a:latin typeface="Calibri" panose="020F0502020204030204" pitchFamily="34" charset="0"/>
+                <a:cs typeface="Calibri" panose="020F0502020204030204" pitchFamily="34" charset="0"/>
+              </a:rPr>
+              <a:t>Computing Methodologies =&gt; Machine Leaning =&gt; Machine Learning Approaches = &gt; Learning Linear Models (</a:t>
+            </a:r>
+            <a:r>
+              <a:rPr lang="en-GB" sz="2000" dirty="0">
+                <a:effectLst/>
+                <a:latin typeface="Calibri" panose="020F0502020204030204" pitchFamily="34" charset="0"/>
+                <a:cs typeface="Calibri" panose="020F0502020204030204" pitchFamily="34" charset="0"/>
+              </a:rPr>
+              <a:t>UYSAL, L et al. 1999) (Lee, K.-Y et al. 2017)</a:t>
+            </a:r>
+            <a:endParaRPr lang="en-US" dirty="0">
+              <a:latin typeface="Calibri" panose="020F0502020204030204" pitchFamily="34" charset="0"/>
+              <a:cs typeface="Calibri" panose="020F0502020204030204" pitchFamily="34" charset="0"/>
+            </a:endParaRPr>
+          </a:p>
+          <a:p>
+            <a:r>
+              <a:rPr lang="en-US" dirty="0">
+                <a:latin typeface="Calibri" panose="020F0502020204030204" pitchFamily="34" charset="0"/>
+                <a:cs typeface="Calibri" panose="020F0502020204030204" pitchFamily="34" charset="0"/>
+              </a:rPr>
               <a:t>Computing methodologies =&gt; Machine Leaning =&gt; Machine Learning Approaches </a:t>
             </a:r>
             <a:r>
-              <a:rPr lang="en-US" i="1" dirty="0"/>
+              <a:rPr lang="en-US" i="1" dirty="0">
+                <a:latin typeface="Calibri" panose="020F0502020204030204" pitchFamily="34" charset="0"/>
+                <a:cs typeface="Calibri" panose="020F0502020204030204" pitchFamily="34" charset="0"/>
+              </a:rPr>
               <a:t>(</a:t>
             </a:r>
             <a:r>
               <a:rPr lang="en-GB" sz="2000" i="1" dirty="0">
                 <a:effectLst/>
-                <a:latin typeface="Times New Roman" panose="02020603050405020304" pitchFamily="18" charset="0"/>
+                <a:latin typeface="Calibri" panose="020F0502020204030204" pitchFamily="34" charset="0"/>
+                <a:cs typeface="Calibri" panose="020F0502020204030204" pitchFamily="34" charset="0"/>
               </a:rPr>
               <a:t>Sadeghi, D</a:t>
             </a:r>
             <a:r>
-              <a:rPr lang="en-US" i="1" dirty="0"/>
+              <a:rPr lang="en-US" i="1" dirty="0">
+                <a:latin typeface="Calibri" panose="020F0502020204030204" pitchFamily="34" charset="0"/>
+                <a:cs typeface="Calibri" panose="020F0502020204030204" pitchFamily="34" charset="0"/>
+              </a:rPr>
               <a:t> et al. 2021)</a:t>
             </a:r>
           </a:p>
           <a:p>
             <a:r>
-              <a:rPr lang="en-US" dirty="0"/>
+              <a:rPr lang="en-US" dirty="0">
+                <a:latin typeface="Calibri" panose="020F0502020204030204" pitchFamily="34" charset="0"/>
+                <a:cs typeface="Calibri" panose="020F0502020204030204" pitchFamily="34" charset="0"/>
+              </a:rPr>
               <a:t>Computing Methodologies =&gt; Modeling and Simulation =&gt; Model Development and Analysis =&gt; Modeling Methodologies </a:t>
             </a:r>
             <a:r>
-              <a:rPr lang="en-US" i="1" dirty="0"/>
+              <a:rPr lang="en-US" i="1" dirty="0">
+                <a:latin typeface="Calibri" panose="020F0502020204030204" pitchFamily="34" charset="0"/>
+                <a:cs typeface="Calibri" panose="020F0502020204030204" pitchFamily="34" charset="0"/>
+              </a:rPr>
               <a:t>(</a:t>
             </a:r>
             <a:r>
               <a:rPr lang="en-GB" sz="2000" i="1" dirty="0" err="1">
                 <a:effectLst/>
-                <a:latin typeface="Times New Roman" panose="02020603050405020304" pitchFamily="18" charset="0"/>
+                <a:latin typeface="Calibri" panose="020F0502020204030204" pitchFamily="34" charset="0"/>
+                <a:cs typeface="Calibri" panose="020F0502020204030204" pitchFamily="34" charset="0"/>
               </a:rPr>
               <a:t>Castanon</a:t>
             </a:r>
             <a:r>
               <a:rPr lang="en-GB" sz="2000" i="1" dirty="0">
                 <a:effectLst/>
-                <a:latin typeface="Times New Roman" panose="02020603050405020304" pitchFamily="18" charset="0"/>
+                <a:latin typeface="Calibri" panose="020F0502020204030204" pitchFamily="34" charset="0"/>
+                <a:cs typeface="Calibri" panose="020F0502020204030204" pitchFamily="34" charset="0"/>
               </a:rPr>
               <a:t>, J. 2019, March 19)</a:t>
             </a:r>
-            <a:endParaRPr lang="en-US" i="1" dirty="0"/>
-          </a:p>
-          <a:p>
-            <a:r>
-              <a:rPr lang="en-US" dirty="0"/>
+            <a:endParaRPr lang="en-US" i="1" dirty="0">
+              <a:latin typeface="Calibri" panose="020F0502020204030204" pitchFamily="34" charset="0"/>
+              <a:cs typeface="Calibri" panose="020F0502020204030204" pitchFamily="34" charset="0"/>
+            </a:endParaRPr>
+          </a:p>
+          <a:p>
+            <a:r>
+              <a:rPr lang="en-US" dirty="0">
+                <a:latin typeface="Calibri" panose="020F0502020204030204" pitchFamily="34" charset="0"/>
+                <a:cs typeface="Calibri" panose="020F0502020204030204" pitchFamily="34" charset="0"/>
+              </a:rPr>
               <a:t>Computing Methodologies =&gt; Modeling and Simulation =&gt; Model Development and Analysis =&gt; Modeling Verification and Validation (</a:t>
             </a:r>
             <a:r>
@@ -4212,15 +4251,15 @@
                 <a:latin typeface="Calibri" panose="020F0502020204030204" pitchFamily="34" charset="0"/>
                 <a:cs typeface="Calibri" panose="020F0502020204030204" pitchFamily="34" charset="0"/>
               </a:rPr>
-              <a:t>Wang, H et al</a:t>
-            </a:r>
-            <a:r>
-              <a:rPr lang="en-GB" sz="2000">
-                <a:effectLst/>
-                <a:latin typeface="Calibri" panose="020F0502020204030204" pitchFamily="34" charset="0"/>
-                <a:cs typeface="Calibri" panose="020F0502020204030204" pitchFamily="34" charset="0"/>
-              </a:rPr>
-              <a:t>. 2013</a:t>
+              <a:t>Wang, H et al. 2013). (</a:t>
+            </a:r>
+            <a:r>
+              <a:rPr lang="en-GB" sz="2000" dirty="0" err="1">
+                <a:effectLst/>
+                <a:latin typeface="Calibri" panose="020F0502020204030204" pitchFamily="34" charset="0"/>
+                <a:cs typeface="Calibri" panose="020F0502020204030204" pitchFamily="34" charset="0"/>
+              </a:rPr>
+              <a:t>Colyer</a:t>
             </a:r>
             <a:r>
               <a:rPr lang="en-GB" sz="2000" dirty="0">
@@ -4228,56 +4267,140 @@
                 <a:latin typeface="Calibri" panose="020F0502020204030204" pitchFamily="34" charset="0"/>
                 <a:cs typeface="Calibri" panose="020F0502020204030204" pitchFamily="34" charset="0"/>
               </a:rPr>
-              <a:t>). </a:t>
-            </a:r>
-            <a:endParaRPr lang="en-US" dirty="0"/>
-          </a:p>
-          <a:p>
-            <a:r>
-              <a:rPr lang="en-US" dirty="0"/>
-              <a:t>Computing Methodologies =&gt; Machine Leaning =&gt; Machine Learning Algorithms = &gt; Feature Selection</a:t>
-            </a:r>
-          </a:p>
-          <a:p>
-            <a:r>
-              <a:rPr lang="en-US" b="1" dirty="0"/>
+              <a:t>, A. 2019, June 5). (</a:t>
+            </a:r>
+            <a:r>
+              <a:rPr lang="en-GB" sz="2000" dirty="0" err="1">
+                <a:effectLst/>
+                <a:latin typeface="Calibri" panose="020F0502020204030204" pitchFamily="34" charset="0"/>
+                <a:cs typeface="Calibri" panose="020F0502020204030204" pitchFamily="34" charset="0"/>
+              </a:rPr>
+              <a:t>Vadavalasa</a:t>
+            </a:r>
+            <a:r>
+              <a:rPr lang="en-GB" sz="2000" dirty="0">
+                <a:effectLst/>
+                <a:latin typeface="Calibri" panose="020F0502020204030204" pitchFamily="34" charset="0"/>
+                <a:cs typeface="Calibri" panose="020F0502020204030204" pitchFamily="34" charset="0"/>
+              </a:rPr>
+              <a:t>, </a:t>
+            </a:r>
+            <a:r>
+              <a:rPr lang="en-GB" sz="2000" dirty="0" err="1">
+                <a:effectLst/>
+                <a:latin typeface="Calibri" panose="020F0502020204030204" pitchFamily="34" charset="0"/>
+                <a:cs typeface="Calibri" panose="020F0502020204030204" pitchFamily="34" charset="0"/>
+              </a:rPr>
+              <a:t>Rammohan</a:t>
+            </a:r>
+            <a:r>
+              <a:rPr lang="en-GB" dirty="0">
+                <a:latin typeface="Calibri" panose="020F0502020204030204" pitchFamily="34" charset="0"/>
+                <a:cs typeface="Calibri" panose="020F0502020204030204" pitchFamily="34" charset="0"/>
+              </a:rPr>
+              <a:t> et al.</a:t>
+            </a:r>
+            <a:r>
+              <a:rPr lang="en-GB" sz="2000" dirty="0">
+                <a:effectLst/>
+                <a:latin typeface="Calibri" panose="020F0502020204030204" pitchFamily="34" charset="0"/>
+                <a:cs typeface="Calibri" panose="020F0502020204030204" pitchFamily="34" charset="0"/>
+              </a:rPr>
+              <a:t> 2021) </a:t>
+            </a:r>
+            <a:endParaRPr lang="en-US" dirty="0">
+              <a:latin typeface="Calibri" panose="020F0502020204030204" pitchFamily="34" charset="0"/>
+              <a:cs typeface="Calibri" panose="020F0502020204030204" pitchFamily="34" charset="0"/>
+            </a:endParaRPr>
+          </a:p>
+          <a:p>
+            <a:r>
+              <a:rPr lang="en-US" dirty="0">
+                <a:latin typeface="Calibri" panose="020F0502020204030204" pitchFamily="34" charset="0"/>
+                <a:cs typeface="Calibri" panose="020F0502020204030204" pitchFamily="34" charset="0"/>
+              </a:rPr>
+              <a:t>Computing Methodologies =&gt; Machine Leaning =&gt; Machine Learning Algorithms = &gt; Feature Selection (</a:t>
+            </a:r>
+            <a:r>
+              <a:rPr lang="en-GB" sz="2000" dirty="0">
+                <a:effectLst/>
+                <a:latin typeface="Calibri" panose="020F0502020204030204" pitchFamily="34" charset="0"/>
+                <a:cs typeface="Calibri" panose="020F0502020204030204" pitchFamily="34" charset="0"/>
+              </a:rPr>
+              <a:t>Chen, R. 2020, July 23). (Hasan, M. A et al. 2015). (Miao, J et al. 2016). </a:t>
+            </a:r>
+            <a:endParaRPr lang="en-US" dirty="0">
+              <a:latin typeface="Calibri" panose="020F0502020204030204" pitchFamily="34" charset="0"/>
+              <a:cs typeface="Calibri" panose="020F0502020204030204" pitchFamily="34" charset="0"/>
+            </a:endParaRPr>
+          </a:p>
+          <a:p>
+            <a:r>
+              <a:rPr lang="en-US" b="1" dirty="0">
+                <a:latin typeface="Calibri" panose="020F0502020204030204" pitchFamily="34" charset="0"/>
+                <a:cs typeface="Calibri" panose="020F0502020204030204" pitchFamily="34" charset="0"/>
+              </a:rPr>
               <a:t>SCOPE:</a:t>
             </a:r>
             <a:r>
-              <a:rPr lang="en-US" dirty="0"/>
+              <a:rPr lang="en-US" dirty="0">
+                <a:latin typeface="Calibri" panose="020F0502020204030204" pitchFamily="34" charset="0"/>
+                <a:cs typeface="Calibri" panose="020F0502020204030204" pitchFamily="34" charset="0"/>
+              </a:rPr>
               <a:t> Investigating difference in performance of regression techniques on fMRI and sMRI modalities preserved in a HDLSS dataset for automatic schizophrenia diagnosis.</a:t>
             </a:r>
           </a:p>
           <a:p>
             <a:r>
-              <a:rPr lang="en-US" b="1" dirty="0"/>
+              <a:rPr lang="en-US" b="1" dirty="0">
+                <a:latin typeface="Calibri" panose="020F0502020204030204" pitchFamily="34" charset="0"/>
+                <a:cs typeface="Calibri" panose="020F0502020204030204" pitchFamily="34" charset="0"/>
+              </a:rPr>
               <a:t>ASSUMPTIONS:</a:t>
             </a:r>
             <a:r>
-              <a:rPr lang="en-US" dirty="0"/>
+              <a:rPr lang="en-US" dirty="0">
+                <a:latin typeface="Calibri" panose="020F0502020204030204" pitchFamily="34" charset="0"/>
+                <a:cs typeface="Calibri" panose="020F0502020204030204" pitchFamily="34" charset="0"/>
+              </a:rPr>
               <a:t> Distance weight discrimination will outperform SVM because it doesn’t depend on feature selection.</a:t>
             </a:r>
           </a:p>
           <a:p>
             <a:r>
-              <a:rPr lang="en-US" b="1" dirty="0"/>
+              <a:rPr lang="en-US" b="1" dirty="0">
+                <a:latin typeface="Calibri" panose="020F0502020204030204" pitchFamily="34" charset="0"/>
+                <a:cs typeface="Calibri" panose="020F0502020204030204" pitchFamily="34" charset="0"/>
+              </a:rPr>
               <a:t>LIMITATIONS:</a:t>
             </a:r>
             <a:r>
-              <a:rPr lang="en-US" dirty="0"/>
+              <a:rPr lang="en-US" dirty="0">
+                <a:latin typeface="Calibri" panose="020F0502020204030204" pitchFamily="34" charset="0"/>
+                <a:cs typeface="Calibri" panose="020F0502020204030204" pitchFamily="34" charset="0"/>
+              </a:rPr>
               <a:t> The complexity of the dataset used or unknown knowledge gaps can be limiting factors.</a:t>
             </a:r>
           </a:p>
           <a:p>
             <a:r>
-              <a:rPr lang="en-US" b="1" dirty="0"/>
+              <a:rPr lang="en-US" b="1" dirty="0">
+                <a:latin typeface="Calibri" panose="020F0502020204030204" pitchFamily="34" charset="0"/>
+                <a:cs typeface="Calibri" panose="020F0502020204030204" pitchFamily="34" charset="0"/>
+              </a:rPr>
               <a:t>DELIMITATIONS: </a:t>
             </a:r>
             <a:r>
-              <a:rPr lang="en-US" dirty="0"/>
+              <a:rPr lang="en-US" dirty="0">
+                <a:latin typeface="Calibri" panose="020F0502020204030204" pitchFamily="34" charset="0"/>
+                <a:cs typeface="Calibri" panose="020F0502020204030204" pitchFamily="34" charset="0"/>
+              </a:rPr>
               <a:t>There are many different approaches to schizophrenia classification that are out of scope for regression techniques that proved to be effective such as clustering.</a:t>
             </a:r>
-            <a:endParaRPr lang="en-GB" dirty="0"/>
+            <a:endParaRPr lang="en-GB" dirty="0">
+              <a:latin typeface="Calibri" panose="020F0502020204030204" pitchFamily="34" charset="0"/>
+              <a:cs typeface="Calibri" panose="020F0502020204030204" pitchFamily="34" charset="0"/>
+            </a:endParaRPr>
           </a:p>
         </p:txBody>
       </p:sp>
@@ -4359,12 +4482,41 @@
         </p:nvSpPr>
         <p:spPr/>
         <p:txBody>
-          <a:bodyPr/>
+          <a:bodyPr>
+            <a:normAutofit lnSpcReduction="10000"/>
+          </a:bodyPr>
           <a:lstStyle/>
           <a:p>
             <a:r>
               <a:rPr lang="en-US" dirty="0"/>
-              <a:t>Gaps in literature paragraph</a:t>
+              <a:t>There is an application gap because of the lack of data and/or restricted access to said data making it difficult to work with on already small datasets. A research idea here would to be use GANs and CADs to investigate the effectiveness of synthesizing data like this and checking its validity against real data. The literature exists and has been applied to available datasets in schizophrenia classification but most techniques used for HDLSS datasets exist in microbiology where researchers work on gene arrays, I think these methodologies could be leveraged in machine learning for rare mental health disorders. (</a:t>
+            </a:r>
+            <a:r>
+              <a:rPr lang="en-GB" sz="2000" dirty="0">
+                <a:effectLst/>
+                <a:latin typeface="Calibri" panose="020F0502020204030204" pitchFamily="34" charset="0"/>
+                <a:cs typeface="Calibri" panose="020F0502020204030204" pitchFamily="34" charset="0"/>
+              </a:rPr>
+              <a:t>Sadeghi, D et al. 2021) </a:t>
+            </a:r>
+            <a:endParaRPr lang="en-US" dirty="0"/>
+          </a:p>
+          <a:p>
+            <a:pPr marL="0" indent="0">
+              <a:buNone/>
+            </a:pPr>
+            <a:r>
+              <a:rPr lang="en-US" dirty="0"/>
+              <a:t>				</a:t>
+            </a:r>
+          </a:p>
+          <a:p>
+            <a:pPr marL="0" indent="0">
+              <a:buNone/>
+            </a:pPr>
+            <a:r>
+              <a:rPr lang="en-US" dirty="0"/>
+              <a:t>				Research Question</a:t>
             </a:r>
           </a:p>
           <a:p>
@@ -4429,7 +4581,7 @@
             <a:pPr algn="ctr"/>
             <a:r>
               <a:rPr lang="en-US" dirty="0"/>
-              <a:t>Hypothesis – place holder text below</a:t>
+              <a:t>Hypothesis</a:t>
             </a:r>
             <a:endParaRPr lang="en-GB" dirty="0"/>
           </a:p>
@@ -4570,39 +4722,37 @@
           <a:p>
             <a:r>
               <a:rPr lang="en-US" dirty="0"/>
-              <a:t>Selected 5 HDLSS methods (SVM, Partial Least Square Regression, Distance Weighted Discrimination, LASSO Regression, Multivariate Regression) used for two class discrimination </a:t>
+              <a:t>Selected regression methods (SVM, Partial Least Square Regression, Distance Weighted Discrimination, LASSO Regression, Multivariate Regression) used for two class discrimination </a:t>
             </a:r>
           </a:p>
           <a:p>
             <a:r>
               <a:rPr lang="en-US" dirty="0"/>
-              <a:t>Construct baseline for each machine learning algorithm used with set configurations</a:t>
+              <a:t>Construct baseline for each machine learning algorithm used</a:t>
             </a:r>
           </a:p>
           <a:p>
             <a:r>
               <a:rPr lang="en-US" dirty="0"/>
-              <a:t>Apply each HDLSS method</a:t>
+              <a:t>Apply each regression method to available dataset/s</a:t>
             </a:r>
           </a:p>
           <a:p>
             <a:r>
               <a:rPr lang="en-US" dirty="0"/>
-              <a:t>Tune models appropriately to each HDLSS method</a:t>
+              <a:t>Tune models appropriately to each HDLSS method document and explore feature selection techniques for tunning</a:t>
             </a:r>
           </a:p>
           <a:p>
             <a:r>
               <a:rPr lang="en-US" dirty="0"/>
-              <a:t>Record and compare results based on AUC performance </a:t>
-            </a:r>
-          </a:p>
-          <a:p>
-            <a:r>
-              <a:rPr lang="en-US" dirty="0"/>
-              <a:t>Potentially research other ways of comparing and measuring results on top of AUC </a:t>
-            </a:r>
-            <a:endParaRPr lang="en-GB" dirty="0"/>
+              <a:t>Record and compare results based on MSE, RMSE</a:t>
+            </a:r>
+            <a:r>
+              <a:rPr lang="en-US"/>
+              <a:t>, MAE</a:t>
+            </a:r>
+            <a:endParaRPr lang="en-US" dirty="0"/>
           </a:p>
         </p:txBody>
       </p:sp>
@@ -4654,8 +4804,8 @@
         </p:nvSpPr>
         <p:spPr>
           <a:xfrm>
-            <a:off x="1069848" y="484632"/>
-            <a:ext cx="10058400" cy="766652"/>
+            <a:off x="1066800" y="120316"/>
+            <a:ext cx="10058400" cy="507837"/>
           </a:xfrm>
         </p:spPr>
         <p:txBody>
@@ -4691,13 +4841,13 @@
         </p:nvSpPr>
         <p:spPr>
           <a:xfrm>
-            <a:off x="1069848" y="1251284"/>
-            <a:ext cx="10058400" cy="5486400"/>
+            <a:off x="0" y="628153"/>
+            <a:ext cx="12192000" cy="6229847"/>
           </a:xfrm>
         </p:spPr>
         <p:txBody>
           <a:bodyPr>
-            <a:normAutofit fontScale="70000" lnSpcReduction="20000"/>
+            <a:noAutofit/>
           </a:bodyPr>
           <a:lstStyle/>
           <a:p>
@@ -4707,7 +4857,7 @@
               </a:lnSpc>
             </a:pPr>
             <a:r>
-              <a:rPr lang="en-GB" sz="1800" dirty="0">
+              <a:rPr lang="en-GB" sz="1200" dirty="0">
                 <a:effectLst/>
                 <a:latin typeface="Calibri" panose="020F0502020204030204" pitchFamily="34" charset="0"/>
                 <a:cs typeface="Calibri" panose="020F0502020204030204" pitchFamily="34" charset="0"/>
@@ -4715,7 +4865,7 @@
               <a:t>Sadeghi, D., </a:t>
             </a:r>
             <a:r>
-              <a:rPr lang="en-GB" sz="1800" dirty="0" err="1">
+              <a:rPr lang="en-GB" sz="1200" dirty="0" err="1">
                 <a:effectLst/>
                 <a:latin typeface="Calibri" panose="020F0502020204030204" pitchFamily="34" charset="0"/>
                 <a:cs typeface="Calibri" panose="020F0502020204030204" pitchFamily="34" charset="0"/>
@@ -4723,7 +4873,7 @@
               <a:t>Shoeibi</a:t>
             </a:r>
             <a:r>
-              <a:rPr lang="en-GB" sz="1800" dirty="0">
+              <a:rPr lang="en-GB" sz="1200" dirty="0">
                 <a:effectLst/>
                 <a:latin typeface="Calibri" panose="020F0502020204030204" pitchFamily="34" charset="0"/>
                 <a:cs typeface="Calibri" panose="020F0502020204030204" pitchFamily="34" charset="0"/>
@@ -4731,7 +4881,7 @@
               <a:t>, A., </a:t>
             </a:r>
             <a:r>
-              <a:rPr lang="en-GB" sz="1800" dirty="0" err="1">
+              <a:rPr lang="en-GB" sz="1200" dirty="0" err="1">
                 <a:effectLst/>
                 <a:latin typeface="Calibri" panose="020F0502020204030204" pitchFamily="34" charset="0"/>
                 <a:cs typeface="Calibri" panose="020F0502020204030204" pitchFamily="34" charset="0"/>
@@ -4739,7 +4889,7 @@
               <a:t>Ghassemi</a:t>
             </a:r>
             <a:r>
-              <a:rPr lang="en-GB" sz="1800" dirty="0">
+              <a:rPr lang="en-GB" sz="1200" dirty="0">
                 <a:effectLst/>
                 <a:latin typeface="Calibri" panose="020F0502020204030204" pitchFamily="34" charset="0"/>
                 <a:cs typeface="Calibri" panose="020F0502020204030204" pitchFamily="34" charset="0"/>
@@ -4747,7 +4897,7 @@
               <a:t>, N., </a:t>
             </a:r>
             <a:r>
-              <a:rPr lang="en-GB" sz="1800" dirty="0" err="1">
+              <a:rPr lang="en-GB" sz="1200" dirty="0" err="1">
                 <a:effectLst/>
                 <a:latin typeface="Calibri" panose="020F0502020204030204" pitchFamily="34" charset="0"/>
                 <a:cs typeface="Calibri" panose="020F0502020204030204" pitchFamily="34" charset="0"/>
@@ -4755,7 +4905,7 @@
               <a:t>Moridian</a:t>
             </a:r>
             <a:r>
-              <a:rPr lang="en-GB" sz="1800" dirty="0">
+              <a:rPr lang="en-GB" sz="1200" dirty="0">
                 <a:effectLst/>
                 <a:latin typeface="Calibri" panose="020F0502020204030204" pitchFamily="34" charset="0"/>
                 <a:cs typeface="Calibri" panose="020F0502020204030204" pitchFamily="34" charset="0"/>
@@ -4763,7 +4913,7 @@
               <a:t>, P., </a:t>
             </a:r>
             <a:r>
-              <a:rPr lang="en-GB" sz="1800" dirty="0" err="1">
+              <a:rPr lang="en-GB" sz="1200" dirty="0" err="1">
                 <a:effectLst/>
                 <a:latin typeface="Calibri" panose="020F0502020204030204" pitchFamily="34" charset="0"/>
                 <a:cs typeface="Calibri" panose="020F0502020204030204" pitchFamily="34" charset="0"/>
@@ -4771,7 +4921,7 @@
               <a:t>Khadem</a:t>
             </a:r>
             <a:r>
-              <a:rPr lang="en-GB" sz="1800" dirty="0">
+              <a:rPr lang="en-GB" sz="1200" dirty="0">
                 <a:effectLst/>
                 <a:latin typeface="Calibri" panose="020F0502020204030204" pitchFamily="34" charset="0"/>
                 <a:cs typeface="Calibri" panose="020F0502020204030204" pitchFamily="34" charset="0"/>
@@ -4779,7 +4929,7 @@
               <a:t>, A., </a:t>
             </a:r>
             <a:r>
-              <a:rPr lang="en-GB" sz="1800" dirty="0" err="1">
+              <a:rPr lang="en-GB" sz="1200" dirty="0" err="1">
                 <a:effectLst/>
                 <a:latin typeface="Calibri" panose="020F0502020204030204" pitchFamily="34" charset="0"/>
                 <a:cs typeface="Calibri" panose="020F0502020204030204" pitchFamily="34" charset="0"/>
@@ -4787,7 +4937,7 @@
               <a:t>Alizadehsani</a:t>
             </a:r>
             <a:r>
-              <a:rPr lang="en-GB" sz="1800" dirty="0">
+              <a:rPr lang="en-GB" sz="1200" dirty="0">
                 <a:effectLst/>
                 <a:latin typeface="Calibri" panose="020F0502020204030204" pitchFamily="34" charset="0"/>
                 <a:cs typeface="Calibri" panose="020F0502020204030204" pitchFamily="34" charset="0"/>
@@ -4795,7 +4945,7 @@
               <a:t>, R., </a:t>
             </a:r>
             <a:r>
-              <a:rPr lang="en-GB" sz="1800" dirty="0" err="1">
+              <a:rPr lang="en-GB" sz="1200" dirty="0" err="1">
                 <a:effectLst/>
                 <a:latin typeface="Calibri" panose="020F0502020204030204" pitchFamily="34" charset="0"/>
                 <a:cs typeface="Calibri" panose="020F0502020204030204" pitchFamily="34" charset="0"/>
@@ -4803,7 +4953,7 @@
               <a:t>Teshnehlab</a:t>
             </a:r>
             <a:r>
-              <a:rPr lang="en-GB" sz="1800" dirty="0">
+              <a:rPr lang="en-GB" sz="1200" dirty="0">
                 <a:effectLst/>
                 <a:latin typeface="Calibri" panose="020F0502020204030204" pitchFamily="34" charset="0"/>
                 <a:cs typeface="Calibri" panose="020F0502020204030204" pitchFamily="34" charset="0"/>
@@ -4811,7 +4961,7 @@
               <a:t>, M., </a:t>
             </a:r>
             <a:r>
-              <a:rPr lang="en-GB" sz="1800" dirty="0" err="1">
+              <a:rPr lang="en-GB" sz="1200" dirty="0" err="1">
                 <a:effectLst/>
                 <a:latin typeface="Calibri" panose="020F0502020204030204" pitchFamily="34" charset="0"/>
                 <a:cs typeface="Calibri" panose="020F0502020204030204" pitchFamily="34" charset="0"/>
@@ -4819,7 +4969,7 @@
               <a:t>Gorriz</a:t>
             </a:r>
             <a:r>
-              <a:rPr lang="en-GB" sz="1800" dirty="0">
+              <a:rPr lang="en-GB" sz="1200" dirty="0">
                 <a:effectLst/>
                 <a:latin typeface="Calibri" panose="020F0502020204030204" pitchFamily="34" charset="0"/>
                 <a:cs typeface="Calibri" panose="020F0502020204030204" pitchFamily="34" charset="0"/>
@@ -4827,7 +4977,7 @@
               <a:t>, J. M., &amp; </a:t>
             </a:r>
             <a:r>
-              <a:rPr lang="en-GB" sz="1800" dirty="0" err="1">
+              <a:rPr lang="en-GB" sz="1200" dirty="0" err="1">
                 <a:effectLst/>
                 <a:latin typeface="Calibri" panose="020F0502020204030204" pitchFamily="34" charset="0"/>
                 <a:cs typeface="Calibri" panose="020F0502020204030204" pitchFamily="34" charset="0"/>
@@ -4835,7 +4985,7 @@
               <a:t>Nahavandi</a:t>
             </a:r>
             <a:r>
-              <a:rPr lang="en-GB" sz="1800" dirty="0">
+              <a:rPr lang="en-GB" sz="1200" dirty="0">
                 <a:effectLst/>
                 <a:latin typeface="Calibri" panose="020F0502020204030204" pitchFamily="34" charset="0"/>
                 <a:cs typeface="Calibri" panose="020F0502020204030204" pitchFamily="34" charset="0"/>
@@ -4843,7 +4993,7 @@
               <a:t>, S. (2021). An Overview on Artificial Intelligence Techniques for Diagnosis of Schizophrenia Based on Magnetic Resonance Imaging Modalities: Methods, Challenges, and Future Works. </a:t>
             </a:r>
             <a:r>
-              <a:rPr lang="en-GB" sz="1800" i="1" dirty="0">
+              <a:rPr lang="en-GB" sz="1200" i="1" dirty="0">
                 <a:effectLst/>
                 <a:latin typeface="Calibri" panose="020F0502020204030204" pitchFamily="34" charset="0"/>
                 <a:cs typeface="Calibri" panose="020F0502020204030204" pitchFamily="34" charset="0"/>
@@ -4851,7 +5001,7 @@
               <a:t>Advanced Researches In Biomedical Engineering Lab.</a:t>
             </a:r>
             <a:r>
-              <a:rPr lang="en-GB" sz="1800" dirty="0">
+              <a:rPr lang="en-GB" sz="1200" dirty="0">
                 <a:effectLst/>
                 <a:latin typeface="Calibri" panose="020F0502020204030204" pitchFamily="34" charset="0"/>
                 <a:cs typeface="Calibri" panose="020F0502020204030204" pitchFamily="34" charset="0"/>
@@ -4866,7 +5016,7 @@
               </a:lnSpc>
             </a:pPr>
             <a:r>
-              <a:rPr lang="en-GB" sz="1800" dirty="0" err="1">
+              <a:rPr lang="en-GB" sz="1200" dirty="0" err="1">
                 <a:effectLst/>
                 <a:latin typeface="Calibri" panose="020F0502020204030204" pitchFamily="34" charset="0"/>
                 <a:cs typeface="Calibri" panose="020F0502020204030204" pitchFamily="34" charset="0"/>
@@ -4874,7 +5024,7 @@
               <a:t>Castanon</a:t>
             </a:r>
             <a:r>
-              <a:rPr lang="en-GB" sz="1800" dirty="0">
+              <a:rPr lang="en-GB" sz="1200" dirty="0">
                 <a:effectLst/>
                 <a:latin typeface="Calibri" panose="020F0502020204030204" pitchFamily="34" charset="0"/>
                 <a:cs typeface="Calibri" panose="020F0502020204030204" pitchFamily="34" charset="0"/>
@@ -4882,7 +5032,7 @@
               <a:t>, J. (2019, March 19). </a:t>
             </a:r>
             <a:r>
-              <a:rPr lang="en-GB" sz="1800" i="1" dirty="0">
+              <a:rPr lang="en-GB" sz="1200" i="1" dirty="0">
                 <a:effectLst/>
                 <a:latin typeface="Calibri" panose="020F0502020204030204" pitchFamily="34" charset="0"/>
                 <a:cs typeface="Calibri" panose="020F0502020204030204" pitchFamily="34" charset="0"/>
@@ -4890,7 +5040,7 @@
               <a:t>10 Machine Learning Methods that Every Data Scientist Should Know</a:t>
             </a:r>
             <a:r>
-              <a:rPr lang="en-GB" sz="1800" dirty="0">
+              <a:rPr lang="en-GB" sz="1200" dirty="0">
                 <a:effectLst/>
                 <a:latin typeface="Calibri" panose="020F0502020204030204" pitchFamily="34" charset="0"/>
                 <a:cs typeface="Calibri" panose="020F0502020204030204" pitchFamily="34" charset="0"/>
@@ -4898,7 +5048,7 @@
               <a:t>. </a:t>
             </a:r>
             <a:r>
-              <a:rPr lang="en-GB" sz="1800" dirty="0" err="1">
+              <a:rPr lang="en-GB" sz="1200" dirty="0" err="1">
                 <a:effectLst/>
                 <a:latin typeface="Calibri" panose="020F0502020204030204" pitchFamily="34" charset="0"/>
                 <a:cs typeface="Calibri" panose="020F0502020204030204" pitchFamily="34" charset="0"/>
@@ -4906,7 +5056,7 @@
               <a:t>Towardsdatascience.Com</a:t>
             </a:r>
             <a:r>
-              <a:rPr lang="en-GB" sz="1800" dirty="0">
+              <a:rPr lang="en-GB" sz="1200" dirty="0">
                 <a:effectLst/>
                 <a:latin typeface="Calibri" panose="020F0502020204030204" pitchFamily="34" charset="0"/>
                 <a:cs typeface="Calibri" panose="020F0502020204030204" pitchFamily="34" charset="0"/>
@@ -4921,7 +5071,7 @@
               </a:lnSpc>
             </a:pPr>
             <a:r>
-              <a:rPr lang="en-GB" sz="1800" dirty="0">
+              <a:rPr lang="en-GB" sz="1200" dirty="0">
                 <a:effectLst/>
                 <a:latin typeface="Calibri" panose="020F0502020204030204" pitchFamily="34" charset="0"/>
                 <a:cs typeface="Calibri" panose="020F0502020204030204" pitchFamily="34" charset="0"/>
@@ -4929,7 +5079,7 @@
               <a:t>Wang, H., &amp; Zheng, H. (2013). Model Validation, Machine Learning. </a:t>
             </a:r>
             <a:r>
-              <a:rPr lang="en-GB" sz="1800" i="1" dirty="0" err="1">
+              <a:rPr lang="en-GB" sz="1200" i="1" dirty="0" err="1">
                 <a:effectLst/>
                 <a:latin typeface="Calibri" panose="020F0502020204030204" pitchFamily="34" charset="0"/>
                 <a:cs typeface="Calibri" panose="020F0502020204030204" pitchFamily="34" charset="0"/>
@@ -4937,7 +5087,7 @@
               <a:t>Encyclopedia</a:t>
             </a:r>
             <a:r>
-              <a:rPr lang="en-GB" sz="1800" i="1" dirty="0">
+              <a:rPr lang="en-GB" sz="1200" i="1" dirty="0">
                 <a:effectLst/>
                 <a:latin typeface="Calibri" panose="020F0502020204030204" pitchFamily="34" charset="0"/>
                 <a:cs typeface="Calibri" panose="020F0502020204030204" pitchFamily="34" charset="0"/>
@@ -4945,7 +5095,7 @@
               <a:t> of Systems Biology</a:t>
             </a:r>
             <a:r>
-              <a:rPr lang="en-GB" sz="1800" dirty="0">
+              <a:rPr lang="en-GB" sz="1200" dirty="0">
                 <a:effectLst/>
                 <a:latin typeface="Calibri" panose="020F0502020204030204" pitchFamily="34" charset="0"/>
                 <a:cs typeface="Calibri" panose="020F0502020204030204" pitchFamily="34" charset="0"/>
@@ -4960,163 +5110,181 @@
               </a:lnSpc>
             </a:pPr>
             <a:r>
-              <a:rPr lang="en-GB" sz="1800" dirty="0">
-                <a:effectLst/>
-                <a:latin typeface="Calibri" panose="020F0502020204030204" pitchFamily="34" charset="0"/>
-                <a:cs typeface="Calibri" panose="020F0502020204030204" pitchFamily="34" charset="0"/>
-              </a:rPr>
-              <a:t>Sadeghi, D., </a:t>
-            </a:r>
-            <a:r>
-              <a:rPr lang="en-GB" sz="1800" dirty="0" err="1">
-                <a:effectLst/>
-                <a:latin typeface="Calibri" panose="020F0502020204030204" pitchFamily="34" charset="0"/>
-                <a:cs typeface="Calibri" panose="020F0502020204030204" pitchFamily="34" charset="0"/>
-              </a:rPr>
-              <a:t>Shoeibi</a:t>
-            </a:r>
-            <a:r>
-              <a:rPr lang="en-GB" sz="1800" dirty="0">
-                <a:effectLst/>
-                <a:latin typeface="Calibri" panose="020F0502020204030204" pitchFamily="34" charset="0"/>
-                <a:cs typeface="Calibri" panose="020F0502020204030204" pitchFamily="34" charset="0"/>
-              </a:rPr>
-              <a:t>, A., </a:t>
-            </a:r>
-            <a:r>
-              <a:rPr lang="en-GB" sz="1800" dirty="0" err="1">
-                <a:effectLst/>
-                <a:latin typeface="Calibri" panose="020F0502020204030204" pitchFamily="34" charset="0"/>
-                <a:cs typeface="Calibri" panose="020F0502020204030204" pitchFamily="34" charset="0"/>
-              </a:rPr>
-              <a:t>Ghassemi</a:t>
-            </a:r>
-            <a:r>
-              <a:rPr lang="en-GB" sz="1800" dirty="0">
-                <a:effectLst/>
-                <a:latin typeface="Calibri" panose="020F0502020204030204" pitchFamily="34" charset="0"/>
-                <a:cs typeface="Calibri" panose="020F0502020204030204" pitchFamily="34" charset="0"/>
-              </a:rPr>
-              <a:t>, N., </a:t>
-            </a:r>
-            <a:r>
-              <a:rPr lang="en-GB" sz="1800" dirty="0" err="1">
-                <a:effectLst/>
-                <a:latin typeface="Calibri" panose="020F0502020204030204" pitchFamily="34" charset="0"/>
-                <a:cs typeface="Calibri" panose="020F0502020204030204" pitchFamily="34" charset="0"/>
-              </a:rPr>
-              <a:t>Moridian</a:t>
-            </a:r>
-            <a:r>
-              <a:rPr lang="en-GB" sz="1800" dirty="0">
-                <a:effectLst/>
-                <a:latin typeface="Calibri" panose="020F0502020204030204" pitchFamily="34" charset="0"/>
-                <a:cs typeface="Calibri" panose="020F0502020204030204" pitchFamily="34" charset="0"/>
-              </a:rPr>
-              <a:t>, P., </a:t>
-            </a:r>
-            <a:r>
-              <a:rPr lang="en-GB" sz="1800" dirty="0" err="1">
-                <a:effectLst/>
-                <a:latin typeface="Calibri" panose="020F0502020204030204" pitchFamily="34" charset="0"/>
-                <a:cs typeface="Calibri" panose="020F0502020204030204" pitchFamily="34" charset="0"/>
-              </a:rPr>
-              <a:t>Khadem</a:t>
-            </a:r>
-            <a:r>
-              <a:rPr lang="en-GB" sz="1800" dirty="0">
-                <a:effectLst/>
-                <a:latin typeface="Calibri" panose="020F0502020204030204" pitchFamily="34" charset="0"/>
-                <a:cs typeface="Calibri" panose="020F0502020204030204" pitchFamily="34" charset="0"/>
-              </a:rPr>
-              <a:t>, A., </a:t>
-            </a:r>
-            <a:r>
-              <a:rPr lang="en-GB" sz="1800" dirty="0" err="1">
-                <a:effectLst/>
-                <a:latin typeface="Calibri" panose="020F0502020204030204" pitchFamily="34" charset="0"/>
-                <a:cs typeface="Calibri" panose="020F0502020204030204" pitchFamily="34" charset="0"/>
-              </a:rPr>
-              <a:t>Alizadehsani</a:t>
-            </a:r>
-            <a:r>
-              <a:rPr lang="en-GB" sz="1800" dirty="0">
-                <a:effectLst/>
-                <a:latin typeface="Calibri" panose="020F0502020204030204" pitchFamily="34" charset="0"/>
-                <a:cs typeface="Calibri" panose="020F0502020204030204" pitchFamily="34" charset="0"/>
-              </a:rPr>
-              <a:t>, R., </a:t>
-            </a:r>
-            <a:r>
-              <a:rPr lang="en-GB" sz="1800" dirty="0" err="1">
-                <a:effectLst/>
-                <a:latin typeface="Calibri" panose="020F0502020204030204" pitchFamily="34" charset="0"/>
-                <a:cs typeface="Calibri" panose="020F0502020204030204" pitchFamily="34" charset="0"/>
-              </a:rPr>
-              <a:t>Teshnehlab</a:t>
-            </a:r>
-            <a:r>
-              <a:rPr lang="en-GB" sz="1800" dirty="0">
-                <a:effectLst/>
-                <a:latin typeface="Calibri" panose="020F0502020204030204" pitchFamily="34" charset="0"/>
-                <a:cs typeface="Calibri" panose="020F0502020204030204" pitchFamily="34" charset="0"/>
-              </a:rPr>
-              <a:t>, M., </a:t>
-            </a:r>
-            <a:r>
-              <a:rPr lang="en-GB" sz="1800" dirty="0" err="1">
-                <a:effectLst/>
-                <a:latin typeface="Calibri" panose="020F0502020204030204" pitchFamily="34" charset="0"/>
-                <a:cs typeface="Calibri" panose="020F0502020204030204" pitchFamily="34" charset="0"/>
-              </a:rPr>
-              <a:t>Gorriz</a:t>
-            </a:r>
-            <a:r>
-              <a:rPr lang="en-GB" sz="1800" dirty="0">
-                <a:effectLst/>
-                <a:latin typeface="Calibri" panose="020F0502020204030204" pitchFamily="34" charset="0"/>
-                <a:cs typeface="Calibri" panose="020F0502020204030204" pitchFamily="34" charset="0"/>
-              </a:rPr>
-              <a:t>, J. M., &amp; </a:t>
-            </a:r>
-            <a:r>
-              <a:rPr lang="en-GB" sz="1800" dirty="0" err="1">
-                <a:effectLst/>
-                <a:latin typeface="Calibri" panose="020F0502020204030204" pitchFamily="34" charset="0"/>
-                <a:cs typeface="Calibri" panose="020F0502020204030204" pitchFamily="34" charset="0"/>
-              </a:rPr>
-              <a:t>Nahavandi</a:t>
-            </a:r>
-            <a:r>
-              <a:rPr lang="en-GB" sz="1800" dirty="0">
-                <a:effectLst/>
-                <a:latin typeface="Calibri" panose="020F0502020204030204" pitchFamily="34" charset="0"/>
-                <a:cs typeface="Calibri" panose="020F0502020204030204" pitchFamily="34" charset="0"/>
-              </a:rPr>
-              <a:t>, S. (2021). An Overview on Artificial Intelligence Techniques for Diagnosis of Schizophrenia Based on Magnetic Resonance Imaging Modalities: Methods, Challenges, and Future Works. </a:t>
-            </a:r>
-            <a:r>
-              <a:rPr lang="en-GB" sz="1800" i="1" dirty="0">
-                <a:effectLst/>
-                <a:latin typeface="Calibri" panose="020F0502020204030204" pitchFamily="34" charset="0"/>
-                <a:cs typeface="Calibri" panose="020F0502020204030204" pitchFamily="34" charset="0"/>
-              </a:rPr>
-              <a:t>Advanced Researches In Biomedical Engineering Lab.</a:t>
-            </a:r>
-            <a:r>
-              <a:rPr lang="en-GB" sz="1800" dirty="0">
-                <a:effectLst/>
-                <a:latin typeface="Calibri" panose="020F0502020204030204" pitchFamily="34" charset="0"/>
-                <a:cs typeface="Calibri" panose="020F0502020204030204" pitchFamily="34" charset="0"/>
-              </a:rPr>
-              <a:t> Published. https://arxiv.org/abs/2103.03081</a:t>
-            </a:r>
+              <a:rPr lang="en-GB" sz="1200" dirty="0">
+                <a:effectLst/>
+                <a:latin typeface="Calibri" panose="020F0502020204030204" pitchFamily="34" charset="0"/>
+                <a:cs typeface="Calibri" panose="020F0502020204030204" pitchFamily="34" charset="0"/>
+              </a:rPr>
+              <a:t>Riccio, V. (2020, September 15). </a:t>
+            </a:r>
+            <a:r>
+              <a:rPr lang="en-GB" sz="1200" i="1" dirty="0">
+                <a:effectLst/>
+                <a:latin typeface="Calibri" panose="020F0502020204030204" pitchFamily="34" charset="0"/>
+                <a:cs typeface="Calibri" panose="020F0502020204030204" pitchFamily="34" charset="0"/>
+              </a:rPr>
+              <a:t>Testing machine learning based systems: a. . .</a:t>
+            </a:r>
+            <a:r>
+              <a:rPr lang="en-GB" sz="1200" dirty="0">
+                <a:effectLst/>
+                <a:latin typeface="Calibri" panose="020F0502020204030204" pitchFamily="34" charset="0"/>
+                <a:cs typeface="Calibri" panose="020F0502020204030204" pitchFamily="34" charset="0"/>
+              </a:rPr>
+              <a:t> Empirical Software Engineering. Retrieved October 28, 2021, from </a:t>
+            </a:r>
+            <a:r>
+              <a:rPr lang="en-GB" sz="1200" dirty="0">
+                <a:latin typeface="Calibri" panose="020F0502020204030204" pitchFamily="34" charset="0"/>
+                <a:cs typeface="Calibri" panose="020F0502020204030204" pitchFamily="34" charset="0"/>
+              </a:rPr>
+              <a:t>https://link.springer.com/article/10.1007/s10664-020-09881-0?error=cookies_not_supported&amp;code=a9b11f32-dc9a-4091-8237-a8c50e2637c3</a:t>
+            </a:r>
+            <a:endParaRPr lang="en-GB" sz="1200" dirty="0">
+              <a:effectLst/>
+              <a:latin typeface="Calibri" panose="020F0502020204030204" pitchFamily="34" charset="0"/>
+              <a:cs typeface="Calibri" panose="020F0502020204030204" pitchFamily="34" charset="0"/>
+            </a:endParaRPr>
+          </a:p>
+          <a:p>
+            <a:pPr marL="457200" indent="-457200">
+              <a:lnSpc>
+                <a:spcPct val="200000"/>
+              </a:lnSpc>
+            </a:pPr>
+            <a:r>
+              <a:rPr lang="en-GB" sz="1200" dirty="0" err="1">
+                <a:effectLst/>
+                <a:latin typeface="Calibri" panose="020F0502020204030204" pitchFamily="34" charset="0"/>
+                <a:cs typeface="Calibri" panose="020F0502020204030204" pitchFamily="34" charset="0"/>
+              </a:rPr>
+              <a:t>Colyer</a:t>
+            </a:r>
+            <a:r>
+              <a:rPr lang="en-GB" sz="1200" dirty="0">
+                <a:effectLst/>
+                <a:latin typeface="Calibri" panose="020F0502020204030204" pitchFamily="34" charset="0"/>
+                <a:cs typeface="Calibri" panose="020F0502020204030204" pitchFamily="34" charset="0"/>
+              </a:rPr>
+              <a:t>, A. (2019, June 5). </a:t>
+            </a:r>
+            <a:r>
+              <a:rPr lang="en-GB" sz="1200" i="1" dirty="0">
+                <a:effectLst/>
+                <a:latin typeface="Calibri" panose="020F0502020204030204" pitchFamily="34" charset="0"/>
+                <a:cs typeface="Calibri" panose="020F0502020204030204" pitchFamily="34" charset="0"/>
+              </a:rPr>
+              <a:t>Data validation for machine learning | the morning paper</a:t>
+            </a:r>
+            <a:r>
+              <a:rPr lang="en-GB" sz="1200" dirty="0">
+                <a:effectLst/>
+                <a:latin typeface="Calibri" panose="020F0502020204030204" pitchFamily="34" charset="0"/>
+                <a:cs typeface="Calibri" panose="020F0502020204030204" pitchFamily="34" charset="0"/>
+              </a:rPr>
+              <a:t>. </a:t>
+            </a:r>
+            <a:r>
+              <a:rPr lang="en-GB" sz="1200" dirty="0" err="1">
+                <a:effectLst/>
+                <a:latin typeface="Calibri" panose="020F0502020204030204" pitchFamily="34" charset="0"/>
+                <a:cs typeface="Calibri" panose="020F0502020204030204" pitchFamily="34" charset="0"/>
+              </a:rPr>
+              <a:t>Blog.Acolyer.Org</a:t>
+            </a:r>
+            <a:r>
+              <a:rPr lang="en-GB" sz="1200" dirty="0">
+                <a:effectLst/>
+                <a:latin typeface="Calibri" panose="020F0502020204030204" pitchFamily="34" charset="0"/>
+                <a:cs typeface="Calibri" panose="020F0502020204030204" pitchFamily="34" charset="0"/>
+              </a:rPr>
+              <a:t>. Retrieved October 28, 2021, from https://blog.acolyer.org/2019/06/05/data-validation-for-machine-learning/</a:t>
+            </a:r>
+            <a:endParaRPr lang="en-GB" sz="1200" dirty="0">
+              <a:latin typeface="Calibri" panose="020F0502020204030204" pitchFamily="34" charset="0"/>
+              <a:cs typeface="Calibri" panose="020F0502020204030204" pitchFamily="34" charset="0"/>
+            </a:endParaRPr>
+          </a:p>
+          <a:p>
+            <a:pPr marL="457200" indent="-457200">
+              <a:lnSpc>
+                <a:spcPct val="200000"/>
+              </a:lnSpc>
+            </a:pPr>
+            <a:r>
+              <a:rPr lang="en-GB" sz="1200" dirty="0" err="1">
+                <a:effectLst/>
+                <a:latin typeface="Calibri" panose="020F0502020204030204" pitchFamily="34" charset="0"/>
+                <a:cs typeface="Calibri" panose="020F0502020204030204" pitchFamily="34" charset="0"/>
+              </a:rPr>
+              <a:t>Vadavalasa</a:t>
+            </a:r>
+            <a:r>
+              <a:rPr lang="en-GB" sz="1200" dirty="0">
+                <a:effectLst/>
+                <a:latin typeface="Calibri" panose="020F0502020204030204" pitchFamily="34" charset="0"/>
+                <a:cs typeface="Calibri" panose="020F0502020204030204" pitchFamily="34" charset="0"/>
+              </a:rPr>
+              <a:t>, </a:t>
+            </a:r>
+            <a:r>
+              <a:rPr lang="en-GB" sz="1200" dirty="0" err="1">
+                <a:effectLst/>
+                <a:latin typeface="Calibri" panose="020F0502020204030204" pitchFamily="34" charset="0"/>
+                <a:cs typeface="Calibri" panose="020F0502020204030204" pitchFamily="34" charset="0"/>
+              </a:rPr>
+              <a:t>Rammohan</a:t>
+            </a:r>
+            <a:r>
+              <a:rPr lang="en-GB" sz="1200" dirty="0">
+                <a:effectLst/>
+                <a:latin typeface="Calibri" panose="020F0502020204030204" pitchFamily="34" charset="0"/>
+                <a:cs typeface="Calibri" panose="020F0502020204030204" pitchFamily="34" charset="0"/>
+              </a:rPr>
+              <a:t>. (2021). Data Validation Process in Machine Learning Pipeline. https://www.researchgate.net/publication/351022721_Data_Validation_Process_in_Machine_Learning_Pipeline</a:t>
+            </a:r>
+          </a:p>
+          <a:p>
+            <a:pPr marL="457200" indent="-457200">
+              <a:lnSpc>
+                <a:spcPct val="200000"/>
+              </a:lnSpc>
+            </a:pPr>
+            <a:endParaRPr lang="en-GB" sz="1200" dirty="0">
+              <a:effectLst/>
+              <a:latin typeface="Calibri" panose="020F0502020204030204" pitchFamily="34" charset="0"/>
+              <a:cs typeface="Calibri" panose="020F0502020204030204" pitchFamily="34" charset="0"/>
+            </a:endParaRPr>
+          </a:p>
+          <a:p>
+            <a:pPr marL="457200" indent="-457200">
+              <a:lnSpc>
+                <a:spcPct val="200000"/>
+              </a:lnSpc>
+            </a:pPr>
+            <a:endParaRPr lang="en-GB" sz="1200" dirty="0">
+              <a:effectLst/>
+              <a:latin typeface="Calibri" panose="020F0502020204030204" pitchFamily="34" charset="0"/>
+              <a:cs typeface="Calibri" panose="020F0502020204030204" pitchFamily="34" charset="0"/>
+            </a:endParaRPr>
+          </a:p>
+          <a:p>
+            <a:pPr marL="457200" indent="-457200">
+              <a:lnSpc>
+                <a:spcPct val="200000"/>
+              </a:lnSpc>
+            </a:pPr>
+            <a:endParaRPr lang="en-GB" sz="1200" dirty="0">
+              <a:effectLst/>
+              <a:latin typeface="Calibri" panose="020F0502020204030204" pitchFamily="34" charset="0"/>
+              <a:cs typeface="Calibri" panose="020F0502020204030204" pitchFamily="34" charset="0"/>
+            </a:endParaRPr>
           </a:p>
           <a:p>
             <a:pPr marL="0" indent="0">
               <a:buNone/>
             </a:pPr>
-            <a:endParaRPr lang="en-GB" dirty="0">
+            <a:endParaRPr lang="en-GB" sz="1200" dirty="0">
               <a:latin typeface="Calibri" panose="020F0502020204030204" pitchFamily="34" charset="0"/>
               <a:cs typeface="Calibri" panose="020F0502020204030204" pitchFamily="34" charset="0"/>
             </a:endParaRPr>
@@ -5169,9 +5337,16 @@
             <p:ph type="title"/>
           </p:nvPr>
         </p:nvSpPr>
-        <p:spPr/>
-        <p:txBody>
-          <a:bodyPr/>
+        <p:spPr>
+          <a:xfrm>
+            <a:off x="1133458" y="144714"/>
+            <a:ext cx="10058400" cy="541086"/>
+          </a:xfrm>
+        </p:spPr>
+        <p:txBody>
+          <a:bodyPr>
+            <a:normAutofit fontScale="90000"/>
+          </a:bodyPr>
           <a:lstStyle/>
           <a:p>
             <a:pPr algn="ctr"/>
@@ -5199,45 +5374,301 @@
             <p:ph idx="1"/>
           </p:nvPr>
         </p:nvSpPr>
-        <p:spPr/>
-        <p:txBody>
-          <a:bodyPr/>
+        <p:spPr>
+          <a:xfrm>
+            <a:off x="127221" y="685800"/>
+            <a:ext cx="11942859" cy="6172200"/>
+          </a:xfrm>
+        </p:spPr>
+        <p:txBody>
+          <a:bodyPr>
+            <a:normAutofit/>
+          </a:bodyPr>
           <a:lstStyle/>
           <a:p>
-            <a:r>
-              <a:rPr lang="en-US" dirty="0"/>
-              <a:t>1</a:t>
-            </a:r>
-          </a:p>
-          <a:p>
-            <a:r>
-              <a:rPr lang="en-US" dirty="0"/>
-              <a:t>2</a:t>
-            </a:r>
-          </a:p>
-          <a:p>
-            <a:r>
-              <a:rPr lang="en-US" dirty="0"/>
-              <a:t>3</a:t>
-            </a:r>
-          </a:p>
-          <a:p>
-            <a:r>
-              <a:rPr lang="en-US" dirty="0"/>
-              <a:t>4</a:t>
-            </a:r>
-          </a:p>
-          <a:p>
-            <a:r>
-              <a:rPr lang="en-US" dirty="0"/>
-              <a:t>5</a:t>
-            </a:r>
-          </a:p>
-          <a:p>
-            <a:pPr marL="0" indent="0">
-              <a:buNone/>
+            <a:pPr marL="457200" indent="-457200">
+              <a:lnSpc>
+                <a:spcPct val="200000"/>
+              </a:lnSpc>
             </a:pPr>
-            <a:endParaRPr lang="en-GB" dirty="0"/>
+            <a:r>
+              <a:rPr lang="en-GB" sz="1200" dirty="0">
+                <a:effectLst/>
+                <a:latin typeface="Calibri" panose="020F0502020204030204" pitchFamily="34" charset="0"/>
+                <a:cs typeface="Calibri" panose="020F0502020204030204" pitchFamily="34" charset="0"/>
+              </a:rPr>
+              <a:t>Chen, R. (2020, July 23). </a:t>
+            </a:r>
+            <a:r>
+              <a:rPr lang="en-GB" sz="1200" i="1" dirty="0">
+                <a:effectLst/>
+                <a:latin typeface="Calibri" panose="020F0502020204030204" pitchFamily="34" charset="0"/>
+                <a:cs typeface="Calibri" panose="020F0502020204030204" pitchFamily="34" charset="0"/>
+              </a:rPr>
+              <a:t>Selecting critical features for data classification based on machine learning methods</a:t>
+            </a:r>
+            <a:r>
+              <a:rPr lang="en-GB" sz="1200" dirty="0">
+                <a:effectLst/>
+                <a:latin typeface="Calibri" panose="020F0502020204030204" pitchFamily="34" charset="0"/>
+                <a:cs typeface="Calibri" panose="020F0502020204030204" pitchFamily="34" charset="0"/>
+              </a:rPr>
+              <a:t>. Journal of Big Data. Retrieved October 28, 2021, from </a:t>
+            </a:r>
+            <a:r>
+              <a:rPr lang="en-GB" sz="1200" dirty="0">
+                <a:latin typeface="Calibri" panose="020F0502020204030204" pitchFamily="34" charset="0"/>
+                <a:cs typeface="Calibri" panose="020F0502020204030204" pitchFamily="34" charset="0"/>
+              </a:rPr>
+              <a:t>https://journalofbigdata.springeropen.com/articles/10.1186/s40537-020-00327-4</a:t>
+            </a:r>
+            <a:endParaRPr lang="en-GB" sz="1200" dirty="0">
+              <a:effectLst/>
+              <a:latin typeface="Calibri" panose="020F0502020204030204" pitchFamily="34" charset="0"/>
+              <a:cs typeface="Calibri" panose="020F0502020204030204" pitchFamily="34" charset="0"/>
+            </a:endParaRPr>
+          </a:p>
+          <a:p>
+            <a:pPr marL="457200" indent="-457200">
+              <a:lnSpc>
+                <a:spcPct val="200000"/>
+              </a:lnSpc>
+            </a:pPr>
+            <a:r>
+              <a:rPr lang="en-GB" sz="1200" dirty="0">
+                <a:effectLst/>
+                <a:latin typeface="Calibri" panose="020F0502020204030204" pitchFamily="34" charset="0"/>
+                <a:cs typeface="Calibri" panose="020F0502020204030204" pitchFamily="34" charset="0"/>
+              </a:rPr>
+              <a:t>Hasan, M. A., Hasan, M. K., &amp; </a:t>
+            </a:r>
+            <a:r>
+              <a:rPr lang="en-GB" sz="1200" dirty="0" err="1">
+                <a:effectLst/>
+                <a:latin typeface="Calibri" panose="020F0502020204030204" pitchFamily="34" charset="0"/>
+                <a:cs typeface="Calibri" panose="020F0502020204030204" pitchFamily="34" charset="0"/>
+              </a:rPr>
+              <a:t>Mottalib</a:t>
+            </a:r>
+            <a:r>
+              <a:rPr lang="en-GB" sz="1200" dirty="0">
+                <a:effectLst/>
+                <a:latin typeface="Calibri" panose="020F0502020204030204" pitchFamily="34" charset="0"/>
+                <a:cs typeface="Calibri" panose="020F0502020204030204" pitchFamily="34" charset="0"/>
+              </a:rPr>
+              <a:t>, M. A. (2015). Linear regression-based feature selection for microarray data classification. </a:t>
+            </a:r>
+            <a:r>
+              <a:rPr lang="en-GB" sz="1200" i="1" dirty="0">
+                <a:effectLst/>
+                <a:latin typeface="Calibri" panose="020F0502020204030204" pitchFamily="34" charset="0"/>
+                <a:cs typeface="Calibri" panose="020F0502020204030204" pitchFamily="34" charset="0"/>
+              </a:rPr>
+              <a:t>International Journal of Data Mining and Bioinformatics</a:t>
+            </a:r>
+            <a:r>
+              <a:rPr lang="en-GB" sz="1200" dirty="0">
+                <a:effectLst/>
+                <a:latin typeface="Calibri" panose="020F0502020204030204" pitchFamily="34" charset="0"/>
+                <a:cs typeface="Calibri" panose="020F0502020204030204" pitchFamily="34" charset="0"/>
+              </a:rPr>
+              <a:t>, </a:t>
+            </a:r>
+            <a:r>
+              <a:rPr lang="en-GB" sz="1200" i="1" dirty="0">
+                <a:effectLst/>
+                <a:latin typeface="Calibri" panose="020F0502020204030204" pitchFamily="34" charset="0"/>
+                <a:cs typeface="Calibri" panose="020F0502020204030204" pitchFamily="34" charset="0"/>
+              </a:rPr>
+              <a:t>11</a:t>
+            </a:r>
+            <a:r>
+              <a:rPr lang="en-GB" sz="1200" dirty="0">
+                <a:effectLst/>
+                <a:latin typeface="Calibri" panose="020F0502020204030204" pitchFamily="34" charset="0"/>
+                <a:cs typeface="Calibri" panose="020F0502020204030204" pitchFamily="34" charset="0"/>
+              </a:rPr>
+              <a:t>(2), 167. </a:t>
+            </a:r>
+            <a:r>
+              <a:rPr lang="en-GB" sz="1200" dirty="0">
+                <a:latin typeface="Calibri" panose="020F0502020204030204" pitchFamily="34" charset="0"/>
+                <a:cs typeface="Calibri" panose="020F0502020204030204" pitchFamily="34" charset="0"/>
+              </a:rPr>
+              <a:t>https://doi.org/10.1504/ijdmb.2015.066776</a:t>
+            </a:r>
+          </a:p>
+          <a:p>
+            <a:pPr marL="457200" indent="-457200">
+              <a:lnSpc>
+                <a:spcPct val="200000"/>
+              </a:lnSpc>
+            </a:pPr>
+            <a:r>
+              <a:rPr lang="en-GB" sz="1200" dirty="0">
+                <a:effectLst/>
+                <a:latin typeface="Calibri" panose="020F0502020204030204" pitchFamily="34" charset="0"/>
+                <a:cs typeface="Calibri" panose="020F0502020204030204" pitchFamily="34" charset="0"/>
+              </a:rPr>
+              <a:t>Miao, J., &amp; </a:t>
+            </a:r>
+            <a:r>
+              <a:rPr lang="en-GB" sz="1200" dirty="0" err="1">
+                <a:effectLst/>
+                <a:latin typeface="Calibri" panose="020F0502020204030204" pitchFamily="34" charset="0"/>
+                <a:cs typeface="Calibri" panose="020F0502020204030204" pitchFamily="34" charset="0"/>
+              </a:rPr>
+              <a:t>Niu</a:t>
+            </a:r>
+            <a:r>
+              <a:rPr lang="en-GB" sz="1200" dirty="0">
+                <a:effectLst/>
+                <a:latin typeface="Calibri" panose="020F0502020204030204" pitchFamily="34" charset="0"/>
+                <a:cs typeface="Calibri" panose="020F0502020204030204" pitchFamily="34" charset="0"/>
+              </a:rPr>
+              <a:t>, L. (2016). A Survey on Feature Selection. </a:t>
+            </a:r>
+            <a:r>
+              <a:rPr lang="en-GB" sz="1200" i="1" dirty="0">
+                <a:effectLst/>
+                <a:latin typeface="Calibri" panose="020F0502020204030204" pitchFamily="34" charset="0"/>
+                <a:cs typeface="Calibri" panose="020F0502020204030204" pitchFamily="34" charset="0"/>
+              </a:rPr>
+              <a:t>Procedia Computer Science</a:t>
+            </a:r>
+            <a:r>
+              <a:rPr lang="en-GB" sz="1200" dirty="0">
+                <a:effectLst/>
+                <a:latin typeface="Calibri" panose="020F0502020204030204" pitchFamily="34" charset="0"/>
+                <a:cs typeface="Calibri" panose="020F0502020204030204" pitchFamily="34" charset="0"/>
+              </a:rPr>
+              <a:t>, </a:t>
+            </a:r>
+            <a:r>
+              <a:rPr lang="en-GB" sz="1200" i="1" dirty="0">
+                <a:effectLst/>
+                <a:latin typeface="Calibri" panose="020F0502020204030204" pitchFamily="34" charset="0"/>
+                <a:cs typeface="Calibri" panose="020F0502020204030204" pitchFamily="34" charset="0"/>
+              </a:rPr>
+              <a:t>91</a:t>
+            </a:r>
+            <a:r>
+              <a:rPr lang="en-GB" sz="1200" dirty="0">
+                <a:effectLst/>
+                <a:latin typeface="Calibri" panose="020F0502020204030204" pitchFamily="34" charset="0"/>
+                <a:cs typeface="Calibri" panose="020F0502020204030204" pitchFamily="34" charset="0"/>
+              </a:rPr>
+              <a:t>, 919–926. </a:t>
+            </a:r>
+            <a:r>
+              <a:rPr lang="en-GB" sz="1200" dirty="0">
+                <a:latin typeface="Calibri" panose="020F0502020204030204" pitchFamily="34" charset="0"/>
+                <a:cs typeface="Calibri" panose="020F0502020204030204" pitchFamily="34" charset="0"/>
+              </a:rPr>
+              <a:t>https://doi.org/10.1016/j.procs.2016.07.111</a:t>
+            </a:r>
+            <a:endParaRPr lang="en-GB" sz="1200" dirty="0">
+              <a:effectLst/>
+              <a:latin typeface="Calibri" panose="020F0502020204030204" pitchFamily="34" charset="0"/>
+              <a:cs typeface="Calibri" panose="020F0502020204030204" pitchFamily="34" charset="0"/>
+            </a:endParaRPr>
+          </a:p>
+          <a:p>
+            <a:pPr marL="457200" indent="-457200">
+              <a:lnSpc>
+                <a:spcPct val="200000"/>
+              </a:lnSpc>
+            </a:pPr>
+            <a:r>
+              <a:rPr lang="en-GB" sz="1200" dirty="0">
+                <a:effectLst/>
+                <a:latin typeface="Calibri" panose="020F0502020204030204" pitchFamily="34" charset="0"/>
+                <a:cs typeface="Calibri" panose="020F0502020204030204" pitchFamily="34" charset="0"/>
+              </a:rPr>
+              <a:t>UYSAL, L., &amp; GÜVENIR, H. A. (1999). An overview of regression techniques for knowledge discovery. </a:t>
+            </a:r>
+            <a:r>
+              <a:rPr lang="en-GB" sz="1200" i="1" dirty="0">
+                <a:effectLst/>
+                <a:latin typeface="Calibri" panose="020F0502020204030204" pitchFamily="34" charset="0"/>
+                <a:cs typeface="Calibri" panose="020F0502020204030204" pitchFamily="34" charset="0"/>
+              </a:rPr>
+              <a:t>The Knowledge Engineering Review</a:t>
+            </a:r>
+            <a:r>
+              <a:rPr lang="en-GB" sz="1200" dirty="0">
+                <a:effectLst/>
+                <a:latin typeface="Calibri" panose="020F0502020204030204" pitchFamily="34" charset="0"/>
+                <a:cs typeface="Calibri" panose="020F0502020204030204" pitchFamily="34" charset="0"/>
+              </a:rPr>
+              <a:t>, </a:t>
+            </a:r>
+            <a:r>
+              <a:rPr lang="en-GB" sz="1200" i="1" dirty="0">
+                <a:effectLst/>
+                <a:latin typeface="Calibri" panose="020F0502020204030204" pitchFamily="34" charset="0"/>
+                <a:cs typeface="Calibri" panose="020F0502020204030204" pitchFamily="34" charset="0"/>
+              </a:rPr>
+              <a:t>14</a:t>
+            </a:r>
+            <a:r>
+              <a:rPr lang="en-GB" sz="1200" dirty="0">
+                <a:effectLst/>
+                <a:latin typeface="Calibri" panose="020F0502020204030204" pitchFamily="34" charset="0"/>
+                <a:cs typeface="Calibri" panose="020F0502020204030204" pitchFamily="34" charset="0"/>
+              </a:rPr>
+              <a:t>(4), 319–340. </a:t>
+            </a:r>
+            <a:r>
+              <a:rPr lang="en-GB" sz="1200" dirty="0">
+                <a:latin typeface="Calibri" panose="020F0502020204030204" pitchFamily="34" charset="0"/>
+                <a:cs typeface="Calibri" panose="020F0502020204030204" pitchFamily="34" charset="0"/>
+              </a:rPr>
+              <a:t>https://doi.org/10.1017/s026988899900404x</a:t>
+            </a:r>
+          </a:p>
+          <a:p>
+            <a:pPr marL="457200" indent="-457200">
+              <a:lnSpc>
+                <a:spcPct val="200000"/>
+              </a:lnSpc>
+            </a:pPr>
+            <a:r>
+              <a:rPr lang="en-GB" sz="1200" dirty="0">
+                <a:effectLst/>
+                <a:latin typeface="Calibri" panose="020F0502020204030204" pitchFamily="34" charset="0"/>
+                <a:cs typeface="Calibri" panose="020F0502020204030204" pitchFamily="34" charset="0"/>
+              </a:rPr>
+              <a:t>Lee, K.-Y &amp; Kim, K.-H &amp; Kang, J.-J &amp; Choi, S.-J &amp; </a:t>
+            </a:r>
+            <a:r>
+              <a:rPr lang="en-GB" sz="1200" dirty="0" err="1">
+                <a:effectLst/>
+                <a:latin typeface="Calibri" panose="020F0502020204030204" pitchFamily="34" charset="0"/>
+                <a:cs typeface="Calibri" panose="020F0502020204030204" pitchFamily="34" charset="0"/>
+              </a:rPr>
+              <a:t>Im</a:t>
+            </a:r>
+            <a:r>
+              <a:rPr lang="en-GB" sz="1200" dirty="0">
+                <a:effectLst/>
+                <a:latin typeface="Calibri" panose="020F0502020204030204" pitchFamily="34" charset="0"/>
+                <a:cs typeface="Calibri" panose="020F0502020204030204" pitchFamily="34" charset="0"/>
+              </a:rPr>
+              <a:t>, Y.-S &amp; Lee, Y.-D &amp; Lim, Y.-S. (2017). Comparison and analysis of linear regression &amp; artificial neural network. International Journal of Applied Engineering Research. 12. 9820-9825.</a:t>
+            </a:r>
+            <a:r>
+              <a:rPr lang="en-GB" sz="1200" dirty="0">
+                <a:latin typeface="Calibri" panose="020F0502020204030204" pitchFamily="34" charset="0"/>
+                <a:cs typeface="Calibri" panose="020F0502020204030204" pitchFamily="34" charset="0"/>
+              </a:rPr>
+              <a:t> https://www.researchgate.net/publication/328827642_Comparison_and_analysis_of_linear_regression_artificial_neural_network</a:t>
+            </a:r>
+            <a:endParaRPr lang="en-GB" sz="1200" dirty="0">
+              <a:effectLst/>
+              <a:latin typeface="Calibri" panose="020F0502020204030204" pitchFamily="34" charset="0"/>
+              <a:cs typeface="Calibri" panose="020F0502020204030204" pitchFamily="34" charset="0"/>
+            </a:endParaRPr>
           </a:p>
         </p:txBody>
       </p:sp>

</xml_diff>

<commit_message>
adding stuff, im tired
</commit_message>
<xml_diff>
--- a/Research Design & Proposal Writting/Assignment 1/c15311966_first_assignment.pptx
+++ b/Research Design & Proposal Writting/Assignment 1/c15311966_first_assignment.pptx
@@ -522,7 +522,7 @@
           <a:p>
             <a:fld id="{83284890-85D2-4D7B-8EF5-15A9C1DB8F42}" type="datetimeFigureOut">
               <a:rPr lang="en-US" dirty="0"/>
-              <a:t>10/28/2021</a:t>
+              <a:t>11/6/2021</a:t>
             </a:fld>
             <a:endParaRPr lang="en-US" dirty="0"/>
           </a:p>
@@ -697,7 +697,7 @@
           <a:p>
             <a:fld id="{87157CC2-0FC8-4686-B024-99790E0F5162}" type="datetimeFigureOut">
               <a:rPr lang="en-US" dirty="0"/>
-              <a:t>10/28/2021</a:t>
+              <a:t>11/6/2021</a:t>
             </a:fld>
             <a:endParaRPr lang="en-US" dirty="0"/>
           </a:p>
@@ -872,7 +872,7 @@
           <a:p>
             <a:fld id="{F6764DA5-CD3D-4590-A511-FCD3BC7A793E}" type="datetimeFigureOut">
               <a:rPr lang="en-US" dirty="0"/>
-              <a:t>10/28/2021</a:t>
+              <a:t>11/6/2021</a:t>
             </a:fld>
             <a:endParaRPr lang="en-US" dirty="0"/>
           </a:p>
@@ -1037,7 +1037,7 @@
           <a:p>
             <a:fld id="{82F5661D-6934-4B32-B92C-470368BF1EC6}" type="datetimeFigureOut">
               <a:rPr lang="en-US" dirty="0"/>
-              <a:t>10/28/2021</a:t>
+              <a:t>11/6/2021</a:t>
             </a:fld>
             <a:endParaRPr lang="en-US" dirty="0"/>
           </a:p>
@@ -1345,7 +1345,7 @@
           <a:p>
             <a:fld id="{C6F822A4-8DA6-4447-9B1F-C5DB58435268}" type="datetimeFigureOut">
               <a:rPr lang="en-US" dirty="0"/>
-              <a:t>10/28/2021</a:t>
+              <a:t>11/6/2021</a:t>
             </a:fld>
             <a:endParaRPr lang="en-US" dirty="0"/>
           </a:p>
@@ -1727,7 +1727,7 @@
           <a:p>
             <a:fld id="{E548D31E-DCDA-41A7-9C67-C4B11B94D21D}" type="datetimeFigureOut">
               <a:rPr lang="en-US" dirty="0"/>
-              <a:t>10/28/2021</a:t>
+              <a:t>11/6/2021</a:t>
             </a:fld>
             <a:endParaRPr lang="en-US" dirty="0"/>
           </a:p>
@@ -2156,7 +2156,7 @@
           <a:p>
             <a:fld id="{9B3762C0-B258-48F1-ADE6-176B4174CCDD}" type="datetimeFigureOut">
               <a:rPr lang="en-US" dirty="0"/>
-              <a:t>10/28/2021</a:t>
+              <a:t>11/6/2021</a:t>
             </a:fld>
             <a:endParaRPr lang="en-US" dirty="0"/>
           </a:p>
@@ -2269,7 +2269,7 @@
           <a:p>
             <a:fld id="{677919A6-33EB-49BD-A62F-1FA56B9F9712}" type="datetimeFigureOut">
               <a:rPr lang="en-US" dirty="0"/>
-              <a:t>10/28/2021</a:t>
+              <a:t>11/6/2021</a:t>
             </a:fld>
             <a:endParaRPr lang="en-US" dirty="0"/>
           </a:p>
@@ -2359,7 +2359,7 @@
           <a:p>
             <a:fld id="{CA4E7D1B-D673-4CF6-8672-009D42ABD2A0}" type="datetimeFigureOut">
               <a:rPr lang="en-US" dirty="0"/>
-              <a:t>10/28/2021</a:t>
+              <a:t>11/6/2021</a:t>
             </a:fld>
             <a:endParaRPr lang="en-US" dirty="0"/>
           </a:p>
@@ -2704,7 +2704,7 @@
           <a:p>
             <a:fld id="{DA16AA21-1863-4931-97CB-99D0A168701B}" type="datetimeFigureOut">
               <a:rPr lang="en-US" dirty="0"/>
-              <a:t>10/28/2021</a:t>
+              <a:t>11/6/2021</a:t>
             </a:fld>
             <a:endParaRPr lang="en-US" dirty="0"/>
           </a:p>
@@ -3124,7 +3124,7 @@
           <a:p>
             <a:fld id="{3772C379-9A7C-4C87-A116-CBE9F58B04C5}" type="datetimeFigureOut">
               <a:rPr lang="en-US" dirty="0"/>
-              <a:t>10/28/2021</a:t>
+              <a:t>11/6/2021</a:t>
             </a:fld>
             <a:endParaRPr lang="en-US" dirty="0"/>
           </a:p>
@@ -3400,7 +3400,7 @@
           <a:p>
             <a:fld id="{8664C608-40B1-4030-A28D-5B74BC98ADCE}" type="datetimeFigureOut">
               <a:rPr lang="en-US" dirty="0"/>
-              <a:t>10/28/2021</a:t>
+              <a:t>11/6/2021</a:t>
             </a:fld>
             <a:endParaRPr lang="en-US" dirty="0"/>
           </a:p>
@@ -4001,10 +4001,16 @@
           <a:p>
             <a:pPr algn="ctr"/>
             <a:r>
-              <a:rPr lang="en-US" sz="8000" dirty="0"/>
+              <a:rPr lang="en-US" sz="6600" dirty="0">
+                <a:latin typeface="Times New Roman" panose="02020603050405020304" pitchFamily="18" charset="0"/>
+                <a:cs typeface="Times New Roman" panose="02020603050405020304" pitchFamily="18" charset="0"/>
+              </a:rPr>
               <a:t>Research Question, Hypothesis and preliminary design</a:t>
             </a:r>
-            <a:endParaRPr lang="en-GB" sz="8000" dirty="0"/>
+            <a:endParaRPr lang="en-GB" sz="6600" dirty="0">
+              <a:latin typeface="Times New Roman" panose="02020603050405020304" pitchFamily="18" charset="0"/>
+              <a:cs typeface="Times New Roman" panose="02020603050405020304" pitchFamily="18" charset="0"/>
+            </a:endParaRPr>
           </a:p>
         </p:txBody>
       </p:sp>
@@ -4038,20 +4044,29 @@
           <a:p>
             <a:pPr algn="ctr"/>
             <a:r>
-              <a:rPr lang="en-US" dirty="0"/>
+              <a:rPr lang="en-US" dirty="0">
+                <a:latin typeface="Times New Roman" panose="02020603050405020304" pitchFamily="18" charset="0"/>
+                <a:cs typeface="Times New Roman" panose="02020603050405020304" pitchFamily="18" charset="0"/>
+              </a:rPr>
               <a:t>Maks Drzezdzon |C15311966</a:t>
             </a:r>
           </a:p>
           <a:p>
             <a:pPr algn="ctr"/>
             <a:r>
-              <a:rPr lang="en-US" dirty="0"/>
+              <a:rPr lang="en-US" dirty="0">
+                <a:latin typeface="Times New Roman" panose="02020603050405020304" pitchFamily="18" charset="0"/>
+                <a:cs typeface="Times New Roman" panose="02020603050405020304" pitchFamily="18" charset="0"/>
+              </a:rPr>
               <a:t>TU060/2 |Data Science</a:t>
             </a:r>
           </a:p>
           <a:p>
             <a:pPr algn="ctr"/>
-            <a:endParaRPr lang="en-GB" dirty="0"/>
+            <a:endParaRPr lang="en-GB" dirty="0">
+              <a:latin typeface="Times New Roman" panose="02020603050405020304" pitchFamily="18" charset="0"/>
+              <a:cs typeface="Times New Roman" panose="02020603050405020304" pitchFamily="18" charset="0"/>
+            </a:endParaRPr>
           </a:p>
         </p:txBody>
       </p:sp>
@@ -4103,8 +4118,8 @@
         </p:nvSpPr>
         <p:spPr>
           <a:xfrm>
-            <a:off x="1066800" y="280737"/>
-            <a:ext cx="10058400" cy="782693"/>
+            <a:off x="1066800" y="280738"/>
+            <a:ext cx="10058400" cy="578004"/>
           </a:xfrm>
         </p:spPr>
         <p:txBody>
@@ -4115,10 +4130,23 @@
           <a:p>
             <a:pPr algn="ctr"/>
             <a:r>
-              <a:rPr lang="en-US" dirty="0"/>
-              <a:t>Domain and scope – ACM 2012</a:t>
-            </a:r>
-            <a:endParaRPr lang="en-GB" dirty="0"/>
+              <a:rPr lang="en-US" dirty="0">
+                <a:latin typeface="Times New Roman" panose="02020603050405020304" pitchFamily="18" charset="0"/>
+                <a:cs typeface="Times New Roman" panose="02020603050405020304" pitchFamily="18" charset="0"/>
+              </a:rPr>
+              <a:t>Domain and scope – ACM 2012 - </a:t>
+            </a:r>
+            <a:r>
+              <a:rPr lang="en-US" b="1" dirty="0">
+                <a:latin typeface="Times New Roman" panose="02020603050405020304" pitchFamily="18" charset="0"/>
+                <a:cs typeface="Times New Roman" panose="02020603050405020304" pitchFamily="18" charset="0"/>
+              </a:rPr>
+              <a:t>Update</a:t>
+            </a:r>
+            <a:endParaRPr lang="en-GB" b="1" dirty="0">
+              <a:latin typeface="Times New Roman" panose="02020603050405020304" pitchFamily="18" charset="0"/>
+              <a:cs typeface="Times New Roman" panose="02020603050405020304" pitchFamily="18" charset="0"/>
+            </a:endParaRPr>
           </a:p>
         </p:txBody>
       </p:sp>
@@ -4140,13 +4168,13 @@
         </p:nvSpPr>
         <p:spPr>
           <a:xfrm>
-            <a:off x="211015" y="1063430"/>
-            <a:ext cx="11711354" cy="5639520"/>
+            <a:off x="211015" y="1208598"/>
+            <a:ext cx="11711354" cy="5494352"/>
           </a:xfrm>
         </p:spPr>
         <p:txBody>
           <a:bodyPr>
-            <a:normAutofit lnSpcReduction="10000"/>
+            <a:normAutofit fontScale="92500" lnSpcReduction="20000"/>
           </a:bodyPr>
           <a:lstStyle/>
           <a:p>
@@ -4163,7 +4191,7 @@
                 <a:latin typeface="Calibri" panose="020F0502020204030204" pitchFamily="34" charset="0"/>
                 <a:cs typeface="Calibri" panose="020F0502020204030204" pitchFamily="34" charset="0"/>
               </a:rPr>
-              <a:t>UYSAL, L et al. 1999) (Lee, K.-Y et al. 2017)</a:t>
+              <a:t>UYSAL, L et al. 1999) (Lee, K.-Y et al. 2017) (Singh Suri et al. 2021) </a:t>
             </a:r>
             <a:endParaRPr lang="en-US" dirty="0">
               <a:latin typeface="Calibri" panose="020F0502020204030204" pitchFamily="34" charset="0"/>
@@ -4176,17 +4204,10 @@
                 <a:latin typeface="Calibri" panose="020F0502020204030204" pitchFamily="34" charset="0"/>
                 <a:cs typeface="Calibri" panose="020F0502020204030204" pitchFamily="34" charset="0"/>
               </a:rPr>
-              <a:t>Computing methodologies =&gt; Machine Leaning =&gt; Machine Learning Approaches </a:t>
-            </a:r>
-            <a:r>
-              <a:rPr lang="en-US" i="1" dirty="0">
-                <a:latin typeface="Calibri" panose="020F0502020204030204" pitchFamily="34" charset="0"/>
-                <a:cs typeface="Calibri" panose="020F0502020204030204" pitchFamily="34" charset="0"/>
-              </a:rPr>
-              <a:t>(</a:t>
-            </a:r>
-            <a:r>
-              <a:rPr lang="en-GB" sz="2000" i="1" dirty="0">
+              <a:t>Computing methodologies =&gt; Machine Leaning =&gt; Machine Learning Approaches (</a:t>
+            </a:r>
+            <a:r>
+              <a:rPr lang="en-GB" sz="2000" dirty="0">
                 <a:effectLst/>
                 <a:latin typeface="Calibri" panose="020F0502020204030204" pitchFamily="34" charset="0"/>
                 <a:cs typeface="Calibri" panose="020F0502020204030204" pitchFamily="34" charset="0"/>
@@ -4194,7 +4215,7 @@
               <a:t>Sadeghi, D</a:t>
             </a:r>
             <a:r>
-              <a:rPr lang="en-US" i="1" dirty="0">
+              <a:rPr lang="en-US" dirty="0">
                 <a:latin typeface="Calibri" panose="020F0502020204030204" pitchFamily="34" charset="0"/>
                 <a:cs typeface="Calibri" panose="020F0502020204030204" pitchFamily="34" charset="0"/>
               </a:rPr>
@@ -4207,17 +4228,10 @@
                 <a:latin typeface="Calibri" panose="020F0502020204030204" pitchFamily="34" charset="0"/>
                 <a:cs typeface="Calibri" panose="020F0502020204030204" pitchFamily="34" charset="0"/>
               </a:rPr>
-              <a:t>Computing Methodologies =&gt; Modeling and Simulation =&gt; Model Development and Analysis =&gt; Modeling Methodologies </a:t>
-            </a:r>
-            <a:r>
-              <a:rPr lang="en-US" i="1" dirty="0">
-                <a:latin typeface="Calibri" panose="020F0502020204030204" pitchFamily="34" charset="0"/>
-                <a:cs typeface="Calibri" panose="020F0502020204030204" pitchFamily="34" charset="0"/>
-              </a:rPr>
-              <a:t>(</a:t>
-            </a:r>
-            <a:r>
-              <a:rPr lang="en-GB" sz="2000" i="1" dirty="0" err="1">
+              <a:t>Computing Methodologies =&gt; Modeling and Simulation =&gt; Model Development and Analysis =&gt; Modeling Methodologies (</a:t>
+            </a:r>
+            <a:r>
+              <a:rPr lang="en-GB" sz="2000" dirty="0" err="1">
                 <a:effectLst/>
                 <a:latin typeface="Calibri" panose="020F0502020204030204" pitchFamily="34" charset="0"/>
                 <a:cs typeface="Calibri" panose="020F0502020204030204" pitchFamily="34" charset="0"/>
@@ -4225,88 +4239,12 @@
               <a:t>Castanon</a:t>
             </a:r>
             <a:r>
-              <a:rPr lang="en-GB" sz="2000" i="1" dirty="0">
-                <a:effectLst/>
-                <a:latin typeface="Calibri" panose="020F0502020204030204" pitchFamily="34" charset="0"/>
-                <a:cs typeface="Calibri" panose="020F0502020204030204" pitchFamily="34" charset="0"/>
-              </a:rPr>
-              <a:t>, J. 2019, March 19)</a:t>
-            </a:r>
-            <a:endParaRPr lang="en-US" i="1" dirty="0">
-              <a:latin typeface="Calibri" panose="020F0502020204030204" pitchFamily="34" charset="0"/>
-              <a:cs typeface="Calibri" panose="020F0502020204030204" pitchFamily="34" charset="0"/>
-            </a:endParaRPr>
-          </a:p>
-          <a:p>
-            <a:r>
-              <a:rPr lang="en-US" dirty="0">
-                <a:latin typeface="Calibri" panose="020F0502020204030204" pitchFamily="34" charset="0"/>
-                <a:cs typeface="Calibri" panose="020F0502020204030204" pitchFamily="34" charset="0"/>
-              </a:rPr>
-              <a:t>Computing Methodologies =&gt; Modeling and Simulation =&gt; Model Development and Analysis =&gt; Modeling Verification and Validation (</a:t>
-            </a:r>
-            <a:r>
               <a:rPr lang="en-GB" sz="2000" dirty="0">
                 <a:effectLst/>
                 <a:latin typeface="Calibri" panose="020F0502020204030204" pitchFamily="34" charset="0"/>
                 <a:cs typeface="Calibri" panose="020F0502020204030204" pitchFamily="34" charset="0"/>
               </a:rPr>
-              <a:t>Wang, H et al. 2013). (</a:t>
-            </a:r>
-            <a:r>
-              <a:rPr lang="en-GB" sz="2000" dirty="0" err="1">
-                <a:effectLst/>
-                <a:latin typeface="Calibri" panose="020F0502020204030204" pitchFamily="34" charset="0"/>
-                <a:cs typeface="Calibri" panose="020F0502020204030204" pitchFamily="34" charset="0"/>
-              </a:rPr>
-              <a:t>Colyer</a:t>
-            </a:r>
-            <a:r>
-              <a:rPr lang="en-GB" sz="2000" dirty="0">
-                <a:effectLst/>
-                <a:latin typeface="Calibri" panose="020F0502020204030204" pitchFamily="34" charset="0"/>
-                <a:cs typeface="Calibri" panose="020F0502020204030204" pitchFamily="34" charset="0"/>
-              </a:rPr>
-              <a:t>, A. 2019, June 5). (</a:t>
-            </a:r>
-            <a:r>
-              <a:rPr lang="en-GB" sz="2000" dirty="0" err="1">
-                <a:effectLst/>
-                <a:latin typeface="Calibri" panose="020F0502020204030204" pitchFamily="34" charset="0"/>
-                <a:cs typeface="Calibri" panose="020F0502020204030204" pitchFamily="34" charset="0"/>
-              </a:rPr>
-              <a:t>Vadavalasa</a:t>
-            </a:r>
-            <a:r>
-              <a:rPr lang="en-GB" sz="2000" dirty="0">
-                <a:effectLst/>
-                <a:latin typeface="Calibri" panose="020F0502020204030204" pitchFamily="34" charset="0"/>
-                <a:cs typeface="Calibri" panose="020F0502020204030204" pitchFamily="34" charset="0"/>
-              </a:rPr>
-              <a:t>, </a:t>
-            </a:r>
-            <a:r>
-              <a:rPr lang="en-GB" sz="2000" dirty="0" err="1">
-                <a:effectLst/>
-                <a:latin typeface="Calibri" panose="020F0502020204030204" pitchFamily="34" charset="0"/>
-                <a:cs typeface="Calibri" panose="020F0502020204030204" pitchFamily="34" charset="0"/>
-              </a:rPr>
-              <a:t>Rammohan</a:t>
-            </a:r>
-            <a:r>
-              <a:rPr lang="en-GB" dirty="0">
-                <a:latin typeface="Calibri" panose="020F0502020204030204" pitchFamily="34" charset="0"/>
-                <a:cs typeface="Calibri" panose="020F0502020204030204" pitchFamily="34" charset="0"/>
-              </a:rPr>
-              <a:t> et al.</a:t>
-            </a:r>
-            <a:r>
-              <a:rPr lang="en-GB" sz="2000" dirty="0">
-                <a:effectLst/>
-                <a:latin typeface="Calibri" panose="020F0502020204030204" pitchFamily="34" charset="0"/>
-                <a:cs typeface="Calibri" panose="020F0502020204030204" pitchFamily="34" charset="0"/>
-              </a:rPr>
-              <a:t> 2021) </a:t>
+              <a:t>, J. 2019, March 19) (Lin E et al. 2021) </a:t>
             </a:r>
             <a:endParaRPr lang="en-US" dirty="0">
               <a:latin typeface="Calibri" panose="020F0502020204030204" pitchFamily="34" charset="0"/>
@@ -4319,7 +4257,7 @@
                 <a:latin typeface="Calibri" panose="020F0502020204030204" pitchFamily="34" charset="0"/>
                 <a:cs typeface="Calibri" panose="020F0502020204030204" pitchFamily="34" charset="0"/>
               </a:rPr>
-              <a:t>Computing Methodologies =&gt; Machine Leaning =&gt; Machine Learning Algorithms = &gt; Feature Selection (</a:t>
+              <a:t>Computing Methodologies =&gt; Modeling and Simulation =&gt; Model Development and Analysis =&gt; Modeling Verification and Validation (</a:t>
             </a:r>
             <a:r>
               <a:rPr lang="en-GB" sz="2000" dirty="0">
@@ -4327,7 +4265,62 @@
                 <a:latin typeface="Calibri" panose="020F0502020204030204" pitchFamily="34" charset="0"/>
                 <a:cs typeface="Calibri" panose="020F0502020204030204" pitchFamily="34" charset="0"/>
               </a:rPr>
-              <a:t>Chen, R. 2020, July 23). (Hasan, M. A et al. 2015). (Miao, J et al. 2016). </a:t>
+              <a:t>Wang, H et al. 2013) (</a:t>
+            </a:r>
+            <a:r>
+              <a:rPr lang="en-GB" sz="2000" dirty="0" err="1">
+                <a:effectLst/>
+                <a:latin typeface="Calibri" panose="020F0502020204030204" pitchFamily="34" charset="0"/>
+                <a:cs typeface="Calibri" panose="020F0502020204030204" pitchFamily="34" charset="0"/>
+              </a:rPr>
+              <a:t>Colyer</a:t>
+            </a:r>
+            <a:r>
+              <a:rPr lang="en-GB" sz="2000" dirty="0">
+                <a:effectLst/>
+                <a:latin typeface="Calibri" panose="020F0502020204030204" pitchFamily="34" charset="0"/>
+                <a:cs typeface="Calibri" panose="020F0502020204030204" pitchFamily="34" charset="0"/>
+              </a:rPr>
+              <a:t>, A. 2019, June 5) (</a:t>
+            </a:r>
+            <a:r>
+              <a:rPr lang="en-GB" sz="2000" dirty="0" err="1">
+                <a:effectLst/>
+                <a:latin typeface="Calibri" panose="020F0502020204030204" pitchFamily="34" charset="0"/>
+                <a:cs typeface="Calibri" panose="020F0502020204030204" pitchFamily="34" charset="0"/>
+              </a:rPr>
+              <a:t>Vadavalasa</a:t>
+            </a:r>
+            <a:r>
+              <a:rPr lang="en-GB" sz="2000" dirty="0">
+                <a:effectLst/>
+                <a:latin typeface="Calibri" panose="020F0502020204030204" pitchFamily="34" charset="0"/>
+                <a:cs typeface="Calibri" panose="020F0502020204030204" pitchFamily="34" charset="0"/>
+              </a:rPr>
+              <a:t>, </a:t>
+            </a:r>
+            <a:r>
+              <a:rPr lang="en-GB" sz="2000" dirty="0" err="1">
+                <a:effectLst/>
+                <a:latin typeface="Calibri" panose="020F0502020204030204" pitchFamily="34" charset="0"/>
+                <a:cs typeface="Calibri" panose="020F0502020204030204" pitchFamily="34" charset="0"/>
+              </a:rPr>
+              <a:t>Rammohan</a:t>
+            </a:r>
+            <a:r>
+              <a:rPr lang="en-GB" dirty="0">
+                <a:latin typeface="Calibri" panose="020F0502020204030204" pitchFamily="34" charset="0"/>
+                <a:cs typeface="Calibri" panose="020F0502020204030204" pitchFamily="34" charset="0"/>
+              </a:rPr>
+              <a:t> et al.</a:t>
+            </a:r>
+            <a:r>
+              <a:rPr lang="en-GB" sz="2000" dirty="0">
+                <a:effectLst/>
+                <a:latin typeface="Calibri" panose="020F0502020204030204" pitchFamily="34" charset="0"/>
+                <a:cs typeface="Calibri" panose="020F0502020204030204" pitchFamily="34" charset="0"/>
+              </a:rPr>
+              <a:t> 2021) </a:t>
             </a:r>
             <a:endParaRPr lang="en-US" dirty="0">
               <a:latin typeface="Calibri" panose="020F0502020204030204" pitchFamily="34" charset="0"/>
@@ -4336,6 +4329,27 @@
           </a:p>
           <a:p>
             <a:r>
+              <a:rPr lang="en-US" dirty="0">
+                <a:latin typeface="Calibri" panose="020F0502020204030204" pitchFamily="34" charset="0"/>
+                <a:cs typeface="Calibri" panose="020F0502020204030204" pitchFamily="34" charset="0"/>
+              </a:rPr>
+              <a:t>Computing Methodologies =&gt; Machine Leaning =&gt; Machine Learning Algorithms = &gt; Feature Selection (</a:t>
+            </a:r>
+            <a:r>
+              <a:rPr lang="en-GB" sz="2000" dirty="0">
+                <a:effectLst/>
+                <a:latin typeface="Calibri" panose="020F0502020204030204" pitchFamily="34" charset="0"/>
+                <a:cs typeface="Calibri" panose="020F0502020204030204" pitchFamily="34" charset="0"/>
+              </a:rPr>
+              <a:t>Chen, R. 2020, July 23) (Hasan, M. A et al. 2015) (Miao, J et al. 2016) </a:t>
+            </a:r>
+            <a:endParaRPr lang="en-US" dirty="0">
+              <a:latin typeface="Calibri" panose="020F0502020204030204" pitchFamily="34" charset="0"/>
+              <a:cs typeface="Calibri" panose="020F0502020204030204" pitchFamily="34" charset="0"/>
+            </a:endParaRPr>
+          </a:p>
+          <a:p>
+            <a:r>
               <a:rPr lang="en-US" b="1" dirty="0">
                 <a:latin typeface="Calibri" panose="020F0502020204030204" pitchFamily="34" charset="0"/>
                 <a:cs typeface="Calibri" panose="020F0502020204030204" pitchFamily="34" charset="0"/>
@@ -4347,7 +4361,7 @@
                 <a:latin typeface="Calibri" panose="020F0502020204030204" pitchFamily="34" charset="0"/>
                 <a:cs typeface="Calibri" panose="020F0502020204030204" pitchFamily="34" charset="0"/>
               </a:rPr>
-              <a:t> Investigating difference in performance of regression techniques on fMRI and sMRI modalities preserved in a HDLSS dataset for automatic schizophrenia diagnosis.</a:t>
+              <a:t> Investigate the difference in performance of regression techniques on fMRI and sMRI modalities presented in a HDLSS dataset</a:t>
             </a:r>
           </a:p>
           <a:p>
@@ -4363,7 +4377,21 @@
                 <a:latin typeface="Calibri" panose="020F0502020204030204" pitchFamily="34" charset="0"/>
                 <a:cs typeface="Calibri" panose="020F0502020204030204" pitchFamily="34" charset="0"/>
               </a:rPr>
-              <a:t> Distance weight discrimination will outperform SVM because it doesn’t depend on feature selection.</a:t>
+              <a:t> Distance weight discrimination will outperform SVM because it doesn’t depend on feature selection (</a:t>
+            </a:r>
+            <a:r>
+              <a:rPr lang="en-GB" dirty="0">
+                <a:latin typeface="Calibri" panose="020F0502020204030204" pitchFamily="34" charset="0"/>
+                <a:cs typeface="Calibri" panose="020F0502020204030204" pitchFamily="34" charset="0"/>
+              </a:rPr>
+              <a:t>assumptions is wrong - its not a copy of hypothesis </a:t>
+            </a:r>
+            <a:r>
+              <a:rPr lang="en-US" dirty="0">
+                <a:latin typeface="Calibri" panose="020F0502020204030204" pitchFamily="34" charset="0"/>
+                <a:cs typeface="Calibri" panose="020F0502020204030204" pitchFamily="34" charset="0"/>
+              </a:rPr>
+              <a:t>)</a:t>
             </a:r>
           </a:p>
           <a:p>
@@ -4379,7 +4407,21 @@
                 <a:latin typeface="Calibri" panose="020F0502020204030204" pitchFamily="34" charset="0"/>
                 <a:cs typeface="Calibri" panose="020F0502020204030204" pitchFamily="34" charset="0"/>
               </a:rPr>
-              <a:t> The complexity of the dataset used or unknown knowledge gaps can be limiting factors.</a:t>
+              <a:t> The complexity of the dataset used or unknown knowledge gaps can be limiting factors (</a:t>
+            </a:r>
+            <a:r>
+              <a:rPr lang="en-GB" dirty="0">
+                <a:latin typeface="Calibri" panose="020F0502020204030204" pitchFamily="34" charset="0"/>
+                <a:cs typeface="Calibri" panose="020F0502020204030204" pitchFamily="34" charset="0"/>
+              </a:rPr>
+              <a:t>limitations is wrong - things are outside of your control (idk)</a:t>
+            </a:r>
+            <a:r>
+              <a:rPr lang="en-US" dirty="0">
+                <a:latin typeface="Calibri" panose="020F0502020204030204" pitchFamily="34" charset="0"/>
+                <a:cs typeface="Calibri" panose="020F0502020204030204" pitchFamily="34" charset="0"/>
+              </a:rPr>
+              <a:t>)</a:t>
             </a:r>
           </a:p>
           <a:p>
@@ -4395,7 +4437,58 @@
                 <a:latin typeface="Calibri" panose="020F0502020204030204" pitchFamily="34" charset="0"/>
                 <a:cs typeface="Calibri" panose="020F0502020204030204" pitchFamily="34" charset="0"/>
               </a:rPr>
-              <a:t>There are many different approaches to schizophrenia classification that are out of scope for regression techniques that proved to be effective such as clustering.</a:t>
+              <a:t>There are many different approaches to schizophrenia classification that are out of scope for regression techniques that proved to be effective such as clustering, deep learning among ensemble approaches (</a:t>
+            </a:r>
+            <a:r>
+              <a:rPr lang="en-GB" dirty="0">
+                <a:latin typeface="Calibri" panose="020F0502020204030204" pitchFamily="34" charset="0"/>
+                <a:cs typeface="Calibri" panose="020F0502020204030204" pitchFamily="34" charset="0"/>
+              </a:rPr>
+              <a:t>delimitation - explain more why you picked regression and why you </a:t>
+            </a:r>
+            <a:r>
+              <a:rPr lang="en-GB" dirty="0" err="1">
+                <a:latin typeface="Calibri" panose="020F0502020204030204" pitchFamily="34" charset="0"/>
+                <a:cs typeface="Calibri" panose="020F0502020204030204" pitchFamily="34" charset="0"/>
+              </a:rPr>
+              <a:t>didnt</a:t>
+            </a:r>
+            <a:r>
+              <a:rPr lang="en-GB" dirty="0">
+                <a:latin typeface="Calibri" panose="020F0502020204030204" pitchFamily="34" charset="0"/>
+                <a:cs typeface="Calibri" panose="020F0502020204030204" pitchFamily="34" charset="0"/>
+              </a:rPr>
+              <a:t> pick others </a:t>
+            </a:r>
+          </a:p>
+          <a:p>
+            <a:r>
+              <a:rPr lang="en-GB" dirty="0">
+                <a:latin typeface="Calibri" panose="020F0502020204030204" pitchFamily="34" charset="0"/>
+                <a:cs typeface="Calibri" panose="020F0502020204030204" pitchFamily="34" charset="0"/>
+              </a:rPr>
+              <a:t>	     - </a:t>
+            </a:r>
+            <a:r>
+              <a:rPr lang="en-GB" dirty="0" err="1">
+                <a:latin typeface="Calibri" panose="020F0502020204030204" pitchFamily="34" charset="0"/>
+                <a:cs typeface="Calibri" panose="020F0502020204030204" pitchFamily="34" charset="0"/>
+              </a:rPr>
+              <a:t>im</a:t>
+            </a:r>
+            <a:r>
+              <a:rPr lang="en-GB" dirty="0">
+                <a:latin typeface="Calibri" panose="020F0502020204030204" pitchFamily="34" charset="0"/>
+                <a:cs typeface="Calibri" panose="020F0502020204030204" pitchFamily="34" charset="0"/>
+              </a:rPr>
+              <a:t> using MSE etc </a:t>
+            </a:r>
+            <a:r>
+              <a:rPr lang="en-US" dirty="0">
+                <a:latin typeface="Calibri" panose="020F0502020204030204" pitchFamily="34" charset="0"/>
+                <a:cs typeface="Calibri" panose="020F0502020204030204" pitchFamily="34" charset="0"/>
+              </a:rPr>
+              <a:t>)</a:t>
             </a:r>
             <a:endParaRPr lang="en-GB" dirty="0">
               <a:latin typeface="Calibri" panose="020F0502020204030204" pitchFamily="34" charset="0"/>
@@ -4450,17 +4543,37 @@
             <p:ph type="title"/>
           </p:nvPr>
         </p:nvSpPr>
-        <p:spPr/>
-        <p:txBody>
-          <a:bodyPr/>
+        <p:spPr>
+          <a:xfrm>
+            <a:off x="1042737" y="222239"/>
+            <a:ext cx="10058400" cy="1609344"/>
+          </a:xfrm>
+        </p:spPr>
+        <p:txBody>
+          <a:bodyPr>
+            <a:normAutofit/>
+          </a:bodyPr>
           <a:lstStyle/>
           <a:p>
             <a:pPr algn="ctr"/>
             <a:r>
-              <a:rPr lang="en-US" dirty="0"/>
-              <a:t>Gaps in the literature review and research question</a:t>
-            </a:r>
-            <a:endParaRPr lang="en-GB" dirty="0"/>
+              <a:rPr lang="en-US" sz="4000" dirty="0">
+                <a:latin typeface="Times New Roman" panose="02020603050405020304" pitchFamily="18" charset="0"/>
+                <a:cs typeface="Times New Roman" panose="02020603050405020304" pitchFamily="18" charset="0"/>
+              </a:rPr>
+              <a:t>Gaps in the literature review and research question - </a:t>
+            </a:r>
+            <a:r>
+              <a:rPr lang="en-US" sz="4000" b="1" dirty="0">
+                <a:latin typeface="Times New Roman" panose="02020603050405020304" pitchFamily="18" charset="0"/>
+                <a:cs typeface="Times New Roman" panose="02020603050405020304" pitchFamily="18" charset="0"/>
+              </a:rPr>
+              <a:t>update</a:t>
+            </a:r>
+            <a:endParaRPr lang="en-GB" sz="4000" b="1" dirty="0">
+              <a:latin typeface="Times New Roman" panose="02020603050405020304" pitchFamily="18" charset="0"/>
+              <a:cs typeface="Times New Roman" panose="02020603050405020304" pitchFamily="18" charset="0"/>
+            </a:endParaRPr>
           </a:p>
         </p:txBody>
       </p:sp>
@@ -4480,16 +4593,24 @@
             <p:ph idx="1"/>
           </p:nvPr>
         </p:nvSpPr>
-        <p:spPr/>
+        <p:spPr>
+          <a:xfrm>
+            <a:off x="144379" y="1831583"/>
+            <a:ext cx="11855116" cy="4713596"/>
+          </a:xfrm>
+        </p:spPr>
         <p:txBody>
           <a:bodyPr>
-            <a:normAutofit lnSpcReduction="10000"/>
+            <a:normAutofit/>
           </a:bodyPr>
           <a:lstStyle/>
           <a:p>
             <a:r>
-              <a:rPr lang="en-US" dirty="0"/>
-              <a:t>There is an application gap because of the lack of data and/or restricted access to said data making it difficult to work with on already small datasets. A research idea here would to be use GANs and CADs to investigate the effectiveness of synthesizing data like this and checking its validity against real data. The literature exists and has been applied to available datasets in schizophrenia classification but most techniques used for HDLSS datasets exist in microbiology where researchers work on gene arrays, I think these methodologies could be leveraged in machine learning for rare mental health disorders. (</a:t>
+              <a:rPr lang="en-US" dirty="0">
+                <a:latin typeface="Calibri" panose="020F0502020204030204" pitchFamily="34" charset="0"/>
+                <a:cs typeface="Calibri" panose="020F0502020204030204" pitchFamily="34" charset="0"/>
+              </a:rPr>
+              <a:t>There is an application gap because of a limited amount of data making it even more difficult when working with an already complex and elusive condition. Deep learning models seem to attain the best performance, however its short lived as it plumets by ~0.25 on an AUC when used to classify new datasets especially from younger cohorts with less extreme or early symptoms. This routes back to the issue of overfitting due to a lack of data, deep learning is prone to overfitting when used on HDLSS data. GANs and CADs could be investigated to see the effectiveness of synthesized data. Required literature exists, most techniques used for HDLSS datasets are in microbiology where researchers work on gene arrays, I think these methodologies could be leveraged for rare mental health disorders, this sparked the investigation to use more traditional approaches such as SVM. (</a:t>
             </a:r>
             <a:r>
               <a:rPr lang="en-GB" sz="2000" dirty="0">
@@ -4497,31 +4618,49 @@
                 <a:latin typeface="Calibri" panose="020F0502020204030204" pitchFamily="34" charset="0"/>
                 <a:cs typeface="Calibri" panose="020F0502020204030204" pitchFamily="34" charset="0"/>
               </a:rPr>
-              <a:t>Sadeghi, D et al. 2021) </a:t>
-            </a:r>
-            <a:endParaRPr lang="en-US" dirty="0"/>
-          </a:p>
-          <a:p>
-            <a:pPr marL="0" indent="0">
+              <a:t>Sadeghi, D et al. 2021) (Cortes-Briones, J. A. et al. 2021) </a:t>
+            </a:r>
+            <a:r>
+              <a:rPr lang="en-US" dirty="0">
+                <a:latin typeface="Calibri" panose="020F0502020204030204" pitchFamily="34" charset="0"/>
+                <a:cs typeface="Calibri" panose="020F0502020204030204" pitchFamily="34" charset="0"/>
+              </a:rPr>
+              <a:t>(</a:t>
+            </a:r>
+            <a:r>
+              <a:rPr lang="en-GB" sz="2000" dirty="0">
+                <a:effectLst/>
+                <a:latin typeface="Calibri" panose="020F0502020204030204" pitchFamily="34" charset="0"/>
+                <a:cs typeface="Calibri" panose="020F0502020204030204" pitchFamily="34" charset="0"/>
+              </a:rPr>
+              <a:t>Oh, J. et al. 2020) </a:t>
+            </a:r>
+            <a:r>
+              <a:rPr lang="en-US" dirty="0">
+                <a:latin typeface="Calibri" panose="020F0502020204030204" pitchFamily="34" charset="0"/>
+                <a:cs typeface="Calibri" panose="020F0502020204030204" pitchFamily="34" charset="0"/>
+              </a:rPr>
+              <a:t>			</a:t>
+            </a:r>
+          </a:p>
+          <a:p>
+            <a:pPr marL="0" indent="0" algn="ctr">
               <a:buNone/>
             </a:pPr>
             <a:r>
-              <a:rPr lang="en-US" dirty="0"/>
-              <a:t>				</a:t>
-            </a:r>
-          </a:p>
-          <a:p>
-            <a:pPr marL="0" indent="0">
-              <a:buNone/>
-            </a:pPr>
-            <a:r>
-              <a:rPr lang="en-US" dirty="0"/>
-              <a:t>				Research Question</a:t>
-            </a:r>
-          </a:p>
-          <a:p>
-            <a:r>
-              <a:rPr lang="en-GB" dirty="0"/>
+              <a:rPr lang="en-US" dirty="0">
+                <a:latin typeface="Calibri" panose="020F0502020204030204" pitchFamily="34" charset="0"/>
+                <a:cs typeface="Calibri" panose="020F0502020204030204" pitchFamily="34" charset="0"/>
+              </a:rPr>
+              <a:t>Research Question</a:t>
+            </a:r>
+          </a:p>
+          <a:p>
+            <a:r>
+              <a:rPr lang="en-GB" dirty="0">
+                <a:latin typeface="Calibri" panose="020F0502020204030204" pitchFamily="34" charset="0"/>
+                <a:cs typeface="Calibri" panose="020F0502020204030204" pitchFamily="34" charset="0"/>
+              </a:rPr>
               <a:t>What are the differences in classification accuracy between different implementations of regression techniques when classifying Schizophrenia using HDLSS data through sMRI and fMRI modalities?</a:t>
             </a:r>
           </a:p>
@@ -4573,17 +4712,28 @@
             <p:ph type="title"/>
           </p:nvPr>
         </p:nvSpPr>
-        <p:spPr/>
+        <p:spPr>
+          <a:xfrm>
+            <a:off x="1066800" y="214288"/>
+            <a:ext cx="10058400" cy="1065872"/>
+          </a:xfrm>
+        </p:spPr>
         <p:txBody>
           <a:bodyPr/>
           <a:lstStyle/>
           <a:p>
             <a:pPr algn="ctr"/>
             <a:r>
-              <a:rPr lang="en-US" dirty="0"/>
+              <a:rPr lang="en-US" dirty="0">
+                <a:latin typeface="Times New Roman" panose="02020603050405020304" pitchFamily="18" charset="0"/>
+                <a:cs typeface="Times New Roman" panose="02020603050405020304" pitchFamily="18" charset="0"/>
+              </a:rPr>
               <a:t>Hypothesis</a:t>
             </a:r>
-            <a:endParaRPr lang="en-GB" dirty="0"/>
+            <a:endParaRPr lang="en-GB" dirty="0">
+              <a:latin typeface="Times New Roman" panose="02020603050405020304" pitchFamily="18" charset="0"/>
+              <a:cs typeface="Times New Roman" panose="02020603050405020304" pitchFamily="18" charset="0"/>
+            </a:endParaRPr>
           </a:p>
         </p:txBody>
       </p:sp>
@@ -4603,38 +4753,57 @@
             <p:ph idx="1"/>
           </p:nvPr>
         </p:nvSpPr>
-        <p:spPr/>
-        <p:txBody>
-          <a:bodyPr/>
+        <p:spPr>
+          <a:xfrm>
+            <a:off x="198783" y="1343770"/>
+            <a:ext cx="11656612" cy="5231959"/>
+          </a:xfrm>
+        </p:spPr>
+        <p:txBody>
+          <a:bodyPr>
+            <a:normAutofit/>
+          </a:bodyPr>
           <a:lstStyle/>
           <a:p>
-            <a:pPr marL="0" indent="0">
+            <a:pPr marL="0" indent="0" algn="ctr">
               <a:buNone/>
             </a:pPr>
             <a:r>
-              <a:rPr lang="en-US" sz="2800" b="1" dirty="0"/>
-              <a:t>Null Hypothesis:</a:t>
-            </a:r>
-          </a:p>
-          <a:p>
-            <a:r>
-              <a:rPr lang="en-US" dirty="0"/>
-              <a:t>There is no statistically significant difference between SVM and DWD classification accuracy</a:t>
-            </a:r>
-          </a:p>
-          <a:p>
-            <a:pPr marL="0" indent="0">
+              <a:rPr lang="en-US" sz="3200" b="1" dirty="0">
+                <a:latin typeface="Calibri" panose="020F0502020204030204" pitchFamily="34" charset="0"/>
+                <a:cs typeface="Calibri" panose="020F0502020204030204" pitchFamily="34" charset="0"/>
+              </a:rPr>
+              <a:t>Null Hypothesis</a:t>
+            </a:r>
+          </a:p>
+          <a:p>
+            <a:r>
+              <a:rPr lang="en-US" sz="3200" dirty="0">
+                <a:latin typeface="Calibri" panose="020F0502020204030204" pitchFamily="34" charset="0"/>
+                <a:cs typeface="Calibri" panose="020F0502020204030204" pitchFamily="34" charset="0"/>
+              </a:rPr>
+              <a:t>There is no statistically significant difference in Mean Square Error, Root Mean Squared Error and Mean Absolute Error when classifying fMRI and sMRI modalities with Support Vector Machine compared to Distance Weighted Discrimination </a:t>
+            </a:r>
+          </a:p>
+          <a:p>
+            <a:pPr marL="0" indent="0" algn="ctr">
               <a:buNone/>
             </a:pPr>
             <a:r>
-              <a:rPr lang="en-US" sz="2800" b="1" dirty="0"/>
-              <a:t>Alternate Hypothesis: </a:t>
-            </a:r>
-          </a:p>
-          <a:p>
-            <a:r>
-              <a:rPr lang="en-US" dirty="0"/>
-              <a:t>There is statistically significant difference between SVM and DWD classification accuracy</a:t>
+              <a:rPr lang="en-US" sz="3200" b="1" dirty="0">
+                <a:latin typeface="Calibri" panose="020F0502020204030204" pitchFamily="34" charset="0"/>
+                <a:cs typeface="Calibri" panose="020F0502020204030204" pitchFamily="34" charset="0"/>
+              </a:rPr>
+              <a:t>Alternate Hypothesis</a:t>
+            </a:r>
+          </a:p>
+          <a:p>
+            <a:r>
+              <a:rPr lang="en-US" sz="3200" dirty="0">
+                <a:latin typeface="Calibri" panose="020F0502020204030204" pitchFamily="34" charset="0"/>
+                <a:cs typeface="Calibri" panose="020F0502020204030204" pitchFamily="34" charset="0"/>
+              </a:rPr>
+              <a:t>If DWD is used to classify fMRI and sMRI modalities, then on average a lower statistically significant Mean Squared Error , Root Mean Squared Error and Mean Absolute Error is expected compared to Support Vector Machine</a:t>
             </a:r>
           </a:p>
         </p:txBody>
@@ -4692,10 +4861,16 @@
           <a:p>
             <a:pPr algn="ctr"/>
             <a:r>
-              <a:rPr lang="en-US" dirty="0"/>
+              <a:rPr lang="en-US" dirty="0">
+                <a:latin typeface="Times New Roman" panose="02020603050405020304" pitchFamily="18" charset="0"/>
+                <a:cs typeface="Times New Roman" panose="02020603050405020304" pitchFamily="18" charset="0"/>
+              </a:rPr>
               <a:t>Feasibility of the study </a:t>
             </a:r>
-            <a:endParaRPr lang="en-GB" dirty="0"/>
+            <a:endParaRPr lang="en-GB" dirty="0">
+              <a:latin typeface="Times New Roman" panose="02020603050405020304" pitchFamily="18" charset="0"/>
+              <a:cs typeface="Times New Roman" panose="02020603050405020304" pitchFamily="18" charset="0"/>
+            </a:endParaRPr>
           </a:p>
         </p:txBody>
       </p:sp>
@@ -4717,42 +4892,92 @@
         </p:nvSpPr>
         <p:spPr/>
         <p:txBody>
-          <a:bodyPr/>
+          <a:bodyPr>
+            <a:normAutofit/>
+          </a:bodyPr>
           <a:lstStyle/>
           <a:p>
             <a:r>
-              <a:rPr lang="en-US" dirty="0"/>
-              <a:t>Selected regression methods (SVM, Partial Least Square Regression, Distance Weighted Discrimination, LASSO Regression, Multivariate Regression) used for two class discrimination </a:t>
-            </a:r>
-          </a:p>
-          <a:p>
-            <a:r>
-              <a:rPr lang="en-US" dirty="0"/>
+              <a:rPr lang="en-US" sz="2400" dirty="0">
+                <a:latin typeface="Calibri" panose="020F0502020204030204" pitchFamily="34" charset="0"/>
+                <a:cs typeface="Calibri" panose="020F0502020204030204" pitchFamily="34" charset="0"/>
+              </a:rPr>
+              <a:t>Select regression methods (SVM, Partial Least Square Regression, Distance Weighted Discrimination, LASSO Regression, Multivariate Regression)</a:t>
+            </a:r>
+          </a:p>
+          <a:p>
+            <a:r>
+              <a:rPr lang="en-US" sz="2400" dirty="0">
+                <a:latin typeface="Calibri" panose="020F0502020204030204" pitchFamily="34" charset="0"/>
+                <a:cs typeface="Calibri" panose="020F0502020204030204" pitchFamily="34" charset="0"/>
+              </a:rPr>
               <a:t>Construct baseline for each machine learning algorithm used</a:t>
             </a:r>
           </a:p>
           <a:p>
             <a:r>
-              <a:rPr lang="en-US" dirty="0"/>
+              <a:rPr lang="en-US" sz="2400" dirty="0">
+                <a:latin typeface="Calibri" panose="020F0502020204030204" pitchFamily="34" charset="0"/>
+                <a:cs typeface="Calibri" panose="020F0502020204030204" pitchFamily="34" charset="0"/>
+              </a:rPr>
               <a:t>Apply each regression method to available dataset/s</a:t>
             </a:r>
           </a:p>
           <a:p>
             <a:r>
-              <a:rPr lang="en-US" dirty="0"/>
+              <a:rPr lang="en-US" sz="2400" dirty="0">
+                <a:latin typeface="Calibri" panose="020F0502020204030204" pitchFamily="34" charset="0"/>
+                <a:cs typeface="Calibri" panose="020F0502020204030204" pitchFamily="34" charset="0"/>
+              </a:rPr>
               <a:t>Tune models appropriately to each HDLSS method document and explore feature selection techniques for tunning</a:t>
             </a:r>
           </a:p>
           <a:p>
             <a:r>
-              <a:rPr lang="en-US" dirty="0"/>
-              <a:t>Record and compare results based on MSE, RMSE</a:t>
-            </a:r>
-            <a:r>
-              <a:rPr lang="en-US"/>
-              <a:t>, MAE</a:t>
-            </a:r>
-            <a:endParaRPr lang="en-US" dirty="0"/>
+              <a:rPr lang="en-US" sz="2400" dirty="0">
+                <a:latin typeface="Calibri" panose="020F0502020204030204" pitchFamily="34" charset="0"/>
+                <a:cs typeface="Calibri" panose="020F0502020204030204" pitchFamily="34" charset="0"/>
+              </a:rPr>
+              <a:t>Record and compare results based on MSE, RMSE, MAE</a:t>
+            </a:r>
+          </a:p>
+          <a:p>
+            <a:r>
+              <a:rPr lang="en-US" sz="2400" dirty="0">
+                <a:latin typeface="Calibri" panose="020F0502020204030204" pitchFamily="34" charset="0"/>
+                <a:cs typeface="Calibri" panose="020F0502020204030204" pitchFamily="34" charset="0"/>
+              </a:rPr>
+              <a:t>Document potential for future work</a:t>
+            </a:r>
+          </a:p>
+          <a:p>
+            <a:r>
+              <a:rPr lang="en-US" sz="2400" b="1" dirty="0">
+                <a:latin typeface="Calibri" panose="020F0502020204030204" pitchFamily="34" charset="0"/>
+                <a:cs typeface="Calibri" panose="020F0502020204030204" pitchFamily="34" charset="0"/>
+              </a:rPr>
+              <a:t>ADD TIMELINES WEEKS 1 – 5 etc. &amp; </a:t>
+            </a:r>
+            <a:r>
+              <a:rPr lang="en-US" sz="2400" b="1">
+                <a:latin typeface="Calibri" panose="020F0502020204030204" pitchFamily="34" charset="0"/>
+                <a:cs typeface="Calibri" panose="020F0502020204030204" pitchFamily="34" charset="0"/>
+              </a:rPr>
+              <a:t>more details </a:t>
+            </a:r>
+            <a:endParaRPr lang="en-US" sz="2400" b="1" dirty="0">
+              <a:latin typeface="Calibri" panose="020F0502020204030204" pitchFamily="34" charset="0"/>
+              <a:cs typeface="Calibri" panose="020F0502020204030204" pitchFamily="34" charset="0"/>
+            </a:endParaRPr>
+          </a:p>
+          <a:p>
+            <a:pPr marL="0" indent="0">
+              <a:buNone/>
+            </a:pPr>
+            <a:endParaRPr lang="en-US" sz="2400" dirty="0">
+              <a:latin typeface="Calibri" panose="020F0502020204030204" pitchFamily="34" charset="0"/>
+              <a:cs typeface="Calibri" panose="020F0502020204030204" pitchFamily="34" charset="0"/>
+            </a:endParaRPr>
           </a:p>
         </p:txBody>
       </p:sp>
@@ -4816,10 +5041,16 @@
           <a:p>
             <a:pPr algn="ctr"/>
             <a:r>
-              <a:rPr lang="en-US" dirty="0"/>
+              <a:rPr lang="en-US" dirty="0">
+                <a:latin typeface="Times New Roman" panose="02020603050405020304" pitchFamily="18" charset="0"/>
+                <a:cs typeface="Times New Roman" panose="02020603050405020304" pitchFamily="18" charset="0"/>
+              </a:rPr>
               <a:t>Bibliography</a:t>
             </a:r>
-            <a:endParaRPr lang="en-GB" dirty="0"/>
+            <a:endParaRPr lang="en-GB" dirty="0">
+              <a:latin typeface="Times New Roman" panose="02020603050405020304" pitchFamily="18" charset="0"/>
+              <a:cs typeface="Times New Roman" panose="02020603050405020304" pitchFamily="18" charset="0"/>
+            </a:endParaRPr>
           </a:p>
         </p:txBody>
       </p:sp>
@@ -5241,8 +5472,79 @@
                 <a:latin typeface="Calibri" panose="020F0502020204030204" pitchFamily="34" charset="0"/>
                 <a:cs typeface="Calibri" panose="020F0502020204030204" pitchFamily="34" charset="0"/>
               </a:rPr>
-              <a:t>. (2021). Data Validation Process in Machine Learning Pipeline. https://www.researchgate.net/publication/351022721_Data_Validation_Process_in_Machine_Learning_Pipeline</a:t>
-            </a:r>
+              <a:t>. (2021). Data Validation Process in Machine Learning Pipeline. </a:t>
+            </a:r>
+            <a:r>
+              <a:rPr lang="en-GB" sz="1200" dirty="0">
+                <a:latin typeface="Calibri" panose="020F0502020204030204" pitchFamily="34" charset="0"/>
+                <a:cs typeface="Calibri" panose="020F0502020204030204" pitchFamily="34" charset="0"/>
+              </a:rPr>
+              <a:t>https://www.researchgate.net/publication/351022721_Data_Validation_Process_in_Machine_Learning_Pipeline</a:t>
+            </a:r>
+            <a:endParaRPr lang="en-GB" sz="1200" dirty="0">
+              <a:effectLst/>
+              <a:latin typeface="Calibri" panose="020F0502020204030204" pitchFamily="34" charset="0"/>
+              <a:cs typeface="Calibri" panose="020F0502020204030204" pitchFamily="34" charset="0"/>
+            </a:endParaRPr>
+          </a:p>
+          <a:p>
+            <a:pPr marL="457200" indent="-457200">
+              <a:lnSpc>
+                <a:spcPct val="200000"/>
+              </a:lnSpc>
+            </a:pPr>
+            <a:r>
+              <a:rPr lang="en-GB" sz="1200" dirty="0">
+                <a:effectLst/>
+                <a:latin typeface="Calibri" panose="020F0502020204030204" pitchFamily="34" charset="0"/>
+                <a:cs typeface="Calibri" panose="020F0502020204030204" pitchFamily="34" charset="0"/>
+              </a:rPr>
+              <a:t>Oh, J., Oh, B. L., Lee, K. U., Chae, J. H., &amp; Yun, K. (2020). Identifying Schizophrenia Using Structural MRI With a Deep Learning Algorithm. </a:t>
+            </a:r>
+            <a:r>
+              <a:rPr lang="en-GB" sz="1200" i="1" dirty="0">
+                <a:effectLst/>
+                <a:latin typeface="Calibri" panose="020F0502020204030204" pitchFamily="34" charset="0"/>
+                <a:cs typeface="Calibri" panose="020F0502020204030204" pitchFamily="34" charset="0"/>
+              </a:rPr>
+              <a:t>Frontiers in Psychiatry</a:t>
+            </a:r>
+            <a:r>
+              <a:rPr lang="en-GB" sz="1200" dirty="0">
+                <a:effectLst/>
+                <a:latin typeface="Calibri" panose="020F0502020204030204" pitchFamily="34" charset="0"/>
+                <a:cs typeface="Calibri" panose="020F0502020204030204" pitchFamily="34" charset="0"/>
+              </a:rPr>
+              <a:t>, </a:t>
+            </a:r>
+            <a:r>
+              <a:rPr lang="en-GB" sz="1200" i="1" dirty="0">
+                <a:effectLst/>
+                <a:latin typeface="Calibri" panose="020F0502020204030204" pitchFamily="34" charset="0"/>
+                <a:cs typeface="Calibri" panose="020F0502020204030204" pitchFamily="34" charset="0"/>
+              </a:rPr>
+              <a:t>11</a:t>
+            </a:r>
+            <a:r>
+              <a:rPr lang="en-GB" sz="1200" dirty="0">
+                <a:effectLst/>
+                <a:latin typeface="Calibri" panose="020F0502020204030204" pitchFamily="34" charset="0"/>
+                <a:cs typeface="Calibri" panose="020F0502020204030204" pitchFamily="34" charset="0"/>
+              </a:rPr>
+              <a:t>. </a:t>
+            </a:r>
+            <a:r>
+              <a:rPr lang="en-GB" sz="1200" dirty="0">
+                <a:latin typeface="Calibri" panose="020F0502020204030204" pitchFamily="34" charset="0"/>
+                <a:cs typeface="Calibri" panose="020F0502020204030204" pitchFamily="34" charset="0"/>
+              </a:rPr>
+              <a:t>https://doi.org/10.3389/fpsyt.2020.00016</a:t>
+            </a:r>
+            <a:endParaRPr lang="en-GB" sz="1200" dirty="0">
+              <a:effectLst/>
+              <a:latin typeface="Calibri" panose="020F0502020204030204" pitchFamily="34" charset="0"/>
+              <a:cs typeface="Calibri" panose="020F0502020204030204" pitchFamily="34" charset="0"/>
+            </a:endParaRPr>
           </a:p>
           <a:p>
             <a:pPr marL="457200" indent="-457200">
@@ -5351,10 +5653,16 @@
           <a:p>
             <a:pPr algn="ctr"/>
             <a:r>
-              <a:rPr lang="en-US" dirty="0"/>
+              <a:rPr lang="en-US" dirty="0">
+                <a:latin typeface="Times New Roman" panose="02020603050405020304" pitchFamily="18" charset="0"/>
+                <a:cs typeface="Times New Roman" panose="02020603050405020304" pitchFamily="18" charset="0"/>
+              </a:rPr>
               <a:t>Bibliography</a:t>
             </a:r>
-            <a:endParaRPr lang="en-GB" dirty="0"/>
+            <a:endParaRPr lang="en-GB" dirty="0">
+              <a:latin typeface="Times New Roman" panose="02020603050405020304" pitchFamily="18" charset="0"/>
+              <a:cs typeface="Times New Roman" panose="02020603050405020304" pitchFamily="18" charset="0"/>
+            </a:endParaRPr>
           </a:p>
         </p:txBody>
       </p:sp>
@@ -5382,7 +5690,7 @@
         </p:spPr>
         <p:txBody>
           <a:bodyPr>
-            <a:normAutofit/>
+            <a:noAutofit/>
           </a:bodyPr>
           <a:lstStyle/>
           <a:p>
@@ -5392,7 +5700,7 @@
               </a:lnSpc>
             </a:pPr>
             <a:r>
-              <a:rPr lang="en-GB" sz="1200" dirty="0">
+              <a:rPr lang="en-GB" sz="1100" dirty="0">
                 <a:effectLst/>
                 <a:latin typeface="Calibri" panose="020F0502020204030204" pitchFamily="34" charset="0"/>
                 <a:cs typeface="Calibri" panose="020F0502020204030204" pitchFamily="34" charset="0"/>
@@ -5400,7 +5708,7 @@
               <a:t>Chen, R. (2020, July 23). </a:t>
             </a:r>
             <a:r>
-              <a:rPr lang="en-GB" sz="1200" i="1" dirty="0">
+              <a:rPr lang="en-GB" sz="1100" i="1" dirty="0">
                 <a:effectLst/>
                 <a:latin typeface="Calibri" panose="020F0502020204030204" pitchFamily="34" charset="0"/>
                 <a:cs typeface="Calibri" panose="020F0502020204030204" pitchFamily="34" charset="0"/>
@@ -5408,7 +5716,7 @@
               <a:t>Selecting critical features for data classification based on machine learning methods</a:t>
             </a:r>
             <a:r>
-              <a:rPr lang="en-GB" sz="1200" dirty="0">
+              <a:rPr lang="en-GB" sz="1100" dirty="0">
                 <a:effectLst/>
                 <a:latin typeface="Calibri" panose="020F0502020204030204" pitchFamily="34" charset="0"/>
                 <a:cs typeface="Calibri" panose="020F0502020204030204" pitchFamily="34" charset="0"/>
@@ -5416,13 +5724,13 @@
               <a:t>. Journal of Big Data. Retrieved October 28, 2021, from </a:t>
             </a:r>
             <a:r>
-              <a:rPr lang="en-GB" sz="1200" dirty="0">
+              <a:rPr lang="en-GB" sz="1100" dirty="0">
                 <a:latin typeface="Calibri" panose="020F0502020204030204" pitchFamily="34" charset="0"/>
                 <a:cs typeface="Calibri" panose="020F0502020204030204" pitchFamily="34" charset="0"/>
               </a:rPr>
               <a:t>https://journalofbigdata.springeropen.com/articles/10.1186/s40537-020-00327-4</a:t>
             </a:r>
-            <a:endParaRPr lang="en-GB" sz="1200" dirty="0">
+            <a:endParaRPr lang="en-GB" sz="1100" dirty="0">
               <a:effectLst/>
               <a:latin typeface="Calibri" panose="020F0502020204030204" pitchFamily="34" charset="0"/>
               <a:cs typeface="Calibri" panose="020F0502020204030204" pitchFamily="34" charset="0"/>
@@ -5435,7 +5743,7 @@
               </a:lnSpc>
             </a:pPr>
             <a:r>
-              <a:rPr lang="en-GB" sz="1200" dirty="0">
+              <a:rPr lang="en-GB" sz="1100" dirty="0">
                 <a:effectLst/>
                 <a:latin typeface="Calibri" panose="020F0502020204030204" pitchFamily="34" charset="0"/>
                 <a:cs typeface="Calibri" panose="020F0502020204030204" pitchFamily="34" charset="0"/>
@@ -5443,7 +5751,7 @@
               <a:t>Hasan, M. A., Hasan, M. K., &amp; </a:t>
             </a:r>
             <a:r>
-              <a:rPr lang="en-GB" sz="1200" dirty="0" err="1">
+              <a:rPr lang="en-GB" sz="1100" dirty="0" err="1">
                 <a:effectLst/>
                 <a:latin typeface="Calibri" panose="020F0502020204030204" pitchFamily="34" charset="0"/>
                 <a:cs typeface="Calibri" panose="020F0502020204030204" pitchFamily="34" charset="0"/>
@@ -5451,7 +5759,7 @@
               <a:t>Mottalib</a:t>
             </a:r>
             <a:r>
-              <a:rPr lang="en-GB" sz="1200" dirty="0">
+              <a:rPr lang="en-GB" sz="1100" dirty="0">
                 <a:effectLst/>
                 <a:latin typeface="Calibri" panose="020F0502020204030204" pitchFamily="34" charset="0"/>
                 <a:cs typeface="Calibri" panose="020F0502020204030204" pitchFamily="34" charset="0"/>
@@ -5459,7 +5767,7 @@
               <a:t>, M. A. (2015). Linear regression-based feature selection for microarray data classification. </a:t>
             </a:r>
             <a:r>
-              <a:rPr lang="en-GB" sz="1200" i="1" dirty="0">
+              <a:rPr lang="en-GB" sz="1100" i="1" dirty="0">
                 <a:effectLst/>
                 <a:latin typeface="Calibri" panose="020F0502020204030204" pitchFamily="34" charset="0"/>
                 <a:cs typeface="Calibri" panose="020F0502020204030204" pitchFamily="34" charset="0"/>
@@ -5467,7 +5775,7 @@
               <a:t>International Journal of Data Mining and Bioinformatics</a:t>
             </a:r>
             <a:r>
-              <a:rPr lang="en-GB" sz="1200" dirty="0">
+              <a:rPr lang="en-GB" sz="1100" dirty="0">
                 <a:effectLst/>
                 <a:latin typeface="Calibri" panose="020F0502020204030204" pitchFamily="34" charset="0"/>
                 <a:cs typeface="Calibri" panose="020F0502020204030204" pitchFamily="34" charset="0"/>
@@ -5475,7 +5783,7 @@
               <a:t>, </a:t>
             </a:r>
             <a:r>
-              <a:rPr lang="en-GB" sz="1200" i="1" dirty="0">
+              <a:rPr lang="en-GB" sz="1100" i="1" dirty="0">
                 <a:effectLst/>
                 <a:latin typeface="Calibri" panose="020F0502020204030204" pitchFamily="34" charset="0"/>
                 <a:cs typeface="Calibri" panose="020F0502020204030204" pitchFamily="34" charset="0"/>
@@ -5483,7 +5791,7 @@
               <a:t>11</a:t>
             </a:r>
             <a:r>
-              <a:rPr lang="en-GB" sz="1200" dirty="0">
+              <a:rPr lang="en-GB" sz="1100" dirty="0">
                 <a:effectLst/>
                 <a:latin typeface="Calibri" panose="020F0502020204030204" pitchFamily="34" charset="0"/>
                 <a:cs typeface="Calibri" panose="020F0502020204030204" pitchFamily="34" charset="0"/>
@@ -5491,7 +5799,7 @@
               <a:t>(2), 167. </a:t>
             </a:r>
             <a:r>
-              <a:rPr lang="en-GB" sz="1200" dirty="0">
+              <a:rPr lang="en-GB" sz="1100" dirty="0">
                 <a:latin typeface="Calibri" panose="020F0502020204030204" pitchFamily="34" charset="0"/>
                 <a:cs typeface="Calibri" panose="020F0502020204030204" pitchFamily="34" charset="0"/>
               </a:rPr>
@@ -5505,7 +5813,7 @@
               </a:lnSpc>
             </a:pPr>
             <a:r>
-              <a:rPr lang="en-GB" sz="1200" dirty="0">
+              <a:rPr lang="en-GB" sz="1100" dirty="0">
                 <a:effectLst/>
                 <a:latin typeface="Calibri" panose="020F0502020204030204" pitchFamily="34" charset="0"/>
                 <a:cs typeface="Calibri" panose="020F0502020204030204" pitchFamily="34" charset="0"/>
@@ -5513,7 +5821,7 @@
               <a:t>Miao, J., &amp; </a:t>
             </a:r>
             <a:r>
-              <a:rPr lang="en-GB" sz="1200" dirty="0" err="1">
+              <a:rPr lang="en-GB" sz="1100" dirty="0" err="1">
                 <a:effectLst/>
                 <a:latin typeface="Calibri" panose="020F0502020204030204" pitchFamily="34" charset="0"/>
                 <a:cs typeface="Calibri" panose="020F0502020204030204" pitchFamily="34" charset="0"/>
@@ -5521,7 +5829,7 @@
               <a:t>Niu</a:t>
             </a:r>
             <a:r>
-              <a:rPr lang="en-GB" sz="1200" dirty="0">
+              <a:rPr lang="en-GB" sz="1100" dirty="0">
                 <a:effectLst/>
                 <a:latin typeface="Calibri" panose="020F0502020204030204" pitchFamily="34" charset="0"/>
                 <a:cs typeface="Calibri" panose="020F0502020204030204" pitchFamily="34" charset="0"/>
@@ -5529,7 +5837,7 @@
               <a:t>, L. (2016). A Survey on Feature Selection. </a:t>
             </a:r>
             <a:r>
-              <a:rPr lang="en-GB" sz="1200" i="1" dirty="0">
+              <a:rPr lang="en-GB" sz="1100" i="1" dirty="0">
                 <a:effectLst/>
                 <a:latin typeface="Calibri" panose="020F0502020204030204" pitchFamily="34" charset="0"/>
                 <a:cs typeface="Calibri" panose="020F0502020204030204" pitchFamily="34" charset="0"/>
@@ -5537,7 +5845,7 @@
               <a:t>Procedia Computer Science</a:t>
             </a:r>
             <a:r>
-              <a:rPr lang="en-GB" sz="1200" dirty="0">
+              <a:rPr lang="en-GB" sz="1100" dirty="0">
                 <a:effectLst/>
                 <a:latin typeface="Calibri" panose="020F0502020204030204" pitchFamily="34" charset="0"/>
                 <a:cs typeface="Calibri" panose="020F0502020204030204" pitchFamily="34" charset="0"/>
@@ -5545,7 +5853,7 @@
               <a:t>, </a:t>
             </a:r>
             <a:r>
-              <a:rPr lang="en-GB" sz="1200" i="1" dirty="0">
+              <a:rPr lang="en-GB" sz="1100" i="1" dirty="0">
                 <a:effectLst/>
                 <a:latin typeface="Calibri" panose="020F0502020204030204" pitchFamily="34" charset="0"/>
                 <a:cs typeface="Calibri" panose="020F0502020204030204" pitchFamily="34" charset="0"/>
@@ -5553,7 +5861,7 @@
               <a:t>91</a:t>
             </a:r>
             <a:r>
-              <a:rPr lang="en-GB" sz="1200" dirty="0">
+              <a:rPr lang="en-GB" sz="1100" dirty="0">
                 <a:effectLst/>
                 <a:latin typeface="Calibri" panose="020F0502020204030204" pitchFamily="34" charset="0"/>
                 <a:cs typeface="Calibri" panose="020F0502020204030204" pitchFamily="34" charset="0"/>
@@ -5561,13 +5869,13 @@
               <a:t>, 919–926. </a:t>
             </a:r>
             <a:r>
-              <a:rPr lang="en-GB" sz="1200" dirty="0">
+              <a:rPr lang="en-GB" sz="1100" dirty="0">
                 <a:latin typeface="Calibri" panose="020F0502020204030204" pitchFamily="34" charset="0"/>
                 <a:cs typeface="Calibri" panose="020F0502020204030204" pitchFamily="34" charset="0"/>
               </a:rPr>
               <a:t>https://doi.org/10.1016/j.procs.2016.07.111</a:t>
             </a:r>
-            <a:endParaRPr lang="en-GB" sz="1200" dirty="0">
+            <a:endParaRPr lang="en-GB" sz="1100" dirty="0">
               <a:effectLst/>
               <a:latin typeface="Calibri" panose="020F0502020204030204" pitchFamily="34" charset="0"/>
               <a:cs typeface="Calibri" panose="020F0502020204030204" pitchFamily="34" charset="0"/>
@@ -5580,7 +5888,7 @@
               </a:lnSpc>
             </a:pPr>
             <a:r>
-              <a:rPr lang="en-GB" sz="1200" dirty="0">
+              <a:rPr lang="en-GB" sz="1100" dirty="0">
                 <a:effectLst/>
                 <a:latin typeface="Calibri" panose="020F0502020204030204" pitchFamily="34" charset="0"/>
                 <a:cs typeface="Calibri" panose="020F0502020204030204" pitchFamily="34" charset="0"/>
@@ -5588,7 +5896,7 @@
               <a:t>UYSAL, L., &amp; GÜVENIR, H. A. (1999). An overview of regression techniques for knowledge discovery. </a:t>
             </a:r>
             <a:r>
-              <a:rPr lang="en-GB" sz="1200" i="1" dirty="0">
+              <a:rPr lang="en-GB" sz="1100" i="1" dirty="0">
                 <a:effectLst/>
                 <a:latin typeface="Calibri" panose="020F0502020204030204" pitchFamily="34" charset="0"/>
                 <a:cs typeface="Calibri" panose="020F0502020204030204" pitchFamily="34" charset="0"/>
@@ -5596,7 +5904,7 @@
               <a:t>The Knowledge Engineering Review</a:t>
             </a:r>
             <a:r>
-              <a:rPr lang="en-GB" sz="1200" dirty="0">
+              <a:rPr lang="en-GB" sz="1100" dirty="0">
                 <a:effectLst/>
                 <a:latin typeface="Calibri" panose="020F0502020204030204" pitchFamily="34" charset="0"/>
                 <a:cs typeface="Calibri" panose="020F0502020204030204" pitchFamily="34" charset="0"/>
@@ -5604,7 +5912,7 @@
               <a:t>, </a:t>
             </a:r>
             <a:r>
-              <a:rPr lang="en-GB" sz="1200" i="1" dirty="0">
+              <a:rPr lang="en-GB" sz="1100" i="1" dirty="0">
                 <a:effectLst/>
                 <a:latin typeface="Calibri" panose="020F0502020204030204" pitchFamily="34" charset="0"/>
                 <a:cs typeface="Calibri" panose="020F0502020204030204" pitchFamily="34" charset="0"/>
@@ -5612,7 +5920,7 @@
               <a:t>14</a:t>
             </a:r>
             <a:r>
-              <a:rPr lang="en-GB" sz="1200" dirty="0">
+              <a:rPr lang="en-GB" sz="1100" dirty="0">
                 <a:effectLst/>
                 <a:latin typeface="Calibri" panose="020F0502020204030204" pitchFamily="34" charset="0"/>
                 <a:cs typeface="Calibri" panose="020F0502020204030204" pitchFamily="34" charset="0"/>
@@ -5620,7 +5928,7 @@
               <a:t>(4), 319–340. </a:t>
             </a:r>
             <a:r>
-              <a:rPr lang="en-GB" sz="1200" dirty="0">
+              <a:rPr lang="en-GB" sz="1100" dirty="0">
                 <a:latin typeface="Calibri" panose="020F0502020204030204" pitchFamily="34" charset="0"/>
                 <a:cs typeface="Calibri" panose="020F0502020204030204" pitchFamily="34" charset="0"/>
               </a:rPr>
@@ -5634,7 +5942,7 @@
               </a:lnSpc>
             </a:pPr>
             <a:r>
-              <a:rPr lang="en-GB" sz="1200" dirty="0">
+              <a:rPr lang="en-GB" sz="1100" dirty="0">
                 <a:effectLst/>
                 <a:latin typeface="Calibri" panose="020F0502020204030204" pitchFamily="34" charset="0"/>
                 <a:cs typeface="Calibri" panose="020F0502020204030204" pitchFamily="34" charset="0"/>
@@ -5642,7 +5950,7 @@
               <a:t>Lee, K.-Y &amp; Kim, K.-H &amp; Kang, J.-J &amp; Choi, S.-J &amp; </a:t>
             </a:r>
             <a:r>
-              <a:rPr lang="en-GB" sz="1200" dirty="0" err="1">
+              <a:rPr lang="en-GB" sz="1100" dirty="0" err="1">
                 <a:effectLst/>
                 <a:latin typeface="Calibri" panose="020F0502020204030204" pitchFamily="34" charset="0"/>
                 <a:cs typeface="Calibri" panose="020F0502020204030204" pitchFamily="34" charset="0"/>
@@ -5650,7 +5958,7 @@
               <a:t>Im</a:t>
             </a:r>
             <a:r>
-              <a:rPr lang="en-GB" sz="1200" dirty="0">
+              <a:rPr lang="en-GB" sz="1100" dirty="0">
                 <a:effectLst/>
                 <a:latin typeface="Calibri" panose="020F0502020204030204" pitchFamily="34" charset="0"/>
                 <a:cs typeface="Calibri" panose="020F0502020204030204" pitchFamily="34" charset="0"/>
@@ -5658,13 +5966,185 @@
               <a:t>, Y.-S &amp; Lee, Y.-D &amp; Lim, Y.-S. (2017). Comparison and analysis of linear regression &amp; artificial neural network. International Journal of Applied Engineering Research. 12. 9820-9825.</a:t>
             </a:r>
             <a:r>
-              <a:rPr lang="en-GB" sz="1200" dirty="0">
+              <a:rPr lang="en-GB" sz="1100" dirty="0">
                 <a:latin typeface="Calibri" panose="020F0502020204030204" pitchFamily="34" charset="0"/>
                 <a:cs typeface="Calibri" panose="020F0502020204030204" pitchFamily="34" charset="0"/>
               </a:rPr>
               <a:t> https://www.researchgate.net/publication/328827642_Comparison_and_analysis_of_linear_regression_artificial_neural_network</a:t>
             </a:r>
-            <a:endParaRPr lang="en-GB" sz="1200" dirty="0">
+          </a:p>
+          <a:p>
+            <a:pPr marL="457200" indent="-457200">
+              <a:lnSpc>
+                <a:spcPct val="200000"/>
+              </a:lnSpc>
+            </a:pPr>
+            <a:r>
+              <a:rPr lang="en-GB" sz="1100" dirty="0">
+                <a:effectLst/>
+                <a:latin typeface="Calibri" panose="020F0502020204030204" pitchFamily="34" charset="0"/>
+                <a:cs typeface="Calibri" panose="020F0502020204030204" pitchFamily="34" charset="0"/>
+              </a:rPr>
+              <a:t>Singh Suri, G., Kaur, G., &amp; </a:t>
+            </a:r>
+            <a:r>
+              <a:rPr lang="en-GB" sz="1100" dirty="0" err="1">
+                <a:effectLst/>
+                <a:latin typeface="Calibri" panose="020F0502020204030204" pitchFamily="34" charset="0"/>
+                <a:cs typeface="Calibri" panose="020F0502020204030204" pitchFamily="34" charset="0"/>
+              </a:rPr>
+              <a:t>Moein</a:t>
+            </a:r>
+            <a:r>
+              <a:rPr lang="en-GB" sz="1100" dirty="0">
+                <a:effectLst/>
+                <a:latin typeface="Calibri" panose="020F0502020204030204" pitchFamily="34" charset="0"/>
+                <a:cs typeface="Calibri" panose="020F0502020204030204" pitchFamily="34" charset="0"/>
+              </a:rPr>
+              <a:t>, S. (2021). Machine Learning in Detecting Schizophrenia: An Overview. </a:t>
+            </a:r>
+            <a:r>
+              <a:rPr lang="en-GB" sz="1100" i="1" dirty="0">
+                <a:effectLst/>
+                <a:latin typeface="Calibri" panose="020F0502020204030204" pitchFamily="34" charset="0"/>
+                <a:cs typeface="Calibri" panose="020F0502020204030204" pitchFamily="34" charset="0"/>
+              </a:rPr>
+              <a:t>Intelligent Automation &amp; Soft Computing</a:t>
+            </a:r>
+            <a:r>
+              <a:rPr lang="en-GB" sz="1100" dirty="0">
+                <a:effectLst/>
+                <a:latin typeface="Calibri" panose="020F0502020204030204" pitchFamily="34" charset="0"/>
+                <a:cs typeface="Calibri" panose="020F0502020204030204" pitchFamily="34" charset="0"/>
+              </a:rPr>
+              <a:t>, </a:t>
+            </a:r>
+            <a:r>
+              <a:rPr lang="en-GB" sz="1100" i="1" dirty="0">
+                <a:effectLst/>
+                <a:latin typeface="Calibri" panose="020F0502020204030204" pitchFamily="34" charset="0"/>
+                <a:cs typeface="Calibri" panose="020F0502020204030204" pitchFamily="34" charset="0"/>
+              </a:rPr>
+              <a:t>27</a:t>
+            </a:r>
+            <a:r>
+              <a:rPr lang="en-GB" sz="1100" dirty="0">
+                <a:effectLst/>
+                <a:latin typeface="Calibri" panose="020F0502020204030204" pitchFamily="34" charset="0"/>
+                <a:cs typeface="Calibri" panose="020F0502020204030204" pitchFamily="34" charset="0"/>
+              </a:rPr>
+              <a:t>(3), 723–735. </a:t>
+            </a:r>
+            <a:r>
+              <a:rPr lang="en-GB" sz="1100" dirty="0">
+                <a:latin typeface="Calibri" panose="020F0502020204030204" pitchFamily="34" charset="0"/>
+                <a:cs typeface="Calibri" panose="020F0502020204030204" pitchFamily="34" charset="0"/>
+              </a:rPr>
+              <a:t>https://doi.org/10.32604/iasc.2021.015049</a:t>
+            </a:r>
+            <a:endParaRPr lang="en-GB" sz="1100" dirty="0">
+              <a:effectLst/>
+              <a:latin typeface="Calibri" panose="020F0502020204030204" pitchFamily="34" charset="0"/>
+              <a:cs typeface="Calibri" panose="020F0502020204030204" pitchFamily="34" charset="0"/>
+            </a:endParaRPr>
+          </a:p>
+          <a:p>
+            <a:pPr marL="457200" indent="-457200">
+              <a:lnSpc>
+                <a:spcPct val="200000"/>
+              </a:lnSpc>
+            </a:pPr>
+            <a:r>
+              <a:rPr lang="en-GB" sz="1100" dirty="0">
+                <a:effectLst/>
+                <a:latin typeface="Calibri" panose="020F0502020204030204" pitchFamily="34" charset="0"/>
+                <a:cs typeface="Calibri" panose="020F0502020204030204" pitchFamily="34" charset="0"/>
+              </a:rPr>
+              <a:t>Lin, E., Lin, C. H., &amp; Lane, H. Y. (2021). Prediction of functional outcomes of schizophrenia with genetic biomarkers using a bagging ensemble machine learning method with feature selection. </a:t>
+            </a:r>
+            <a:r>
+              <a:rPr lang="en-GB" sz="1100" i="1" dirty="0">
+                <a:effectLst/>
+                <a:latin typeface="Calibri" panose="020F0502020204030204" pitchFamily="34" charset="0"/>
+                <a:cs typeface="Calibri" panose="020F0502020204030204" pitchFamily="34" charset="0"/>
+              </a:rPr>
+              <a:t>Scientific Reports</a:t>
+            </a:r>
+            <a:r>
+              <a:rPr lang="en-GB" sz="1100" dirty="0">
+                <a:effectLst/>
+                <a:latin typeface="Calibri" panose="020F0502020204030204" pitchFamily="34" charset="0"/>
+                <a:cs typeface="Calibri" panose="020F0502020204030204" pitchFamily="34" charset="0"/>
+              </a:rPr>
+              <a:t>, </a:t>
+            </a:r>
+            <a:r>
+              <a:rPr lang="en-GB" sz="1100" i="1" dirty="0">
+                <a:effectLst/>
+                <a:latin typeface="Calibri" panose="020F0502020204030204" pitchFamily="34" charset="0"/>
+                <a:cs typeface="Calibri" panose="020F0502020204030204" pitchFamily="34" charset="0"/>
+              </a:rPr>
+              <a:t>11</a:t>
+            </a:r>
+            <a:r>
+              <a:rPr lang="en-GB" sz="1100" dirty="0">
+                <a:effectLst/>
+                <a:latin typeface="Calibri" panose="020F0502020204030204" pitchFamily="34" charset="0"/>
+                <a:cs typeface="Calibri" panose="020F0502020204030204" pitchFamily="34" charset="0"/>
+              </a:rPr>
+              <a:t>(1). https://doi.org/10.1038/s41598-021-89540-6</a:t>
+            </a:r>
+          </a:p>
+          <a:p>
+            <a:pPr marL="457200" indent="-457200">
+              <a:lnSpc>
+                <a:spcPct val="200000"/>
+              </a:lnSpc>
+            </a:pPr>
+            <a:r>
+              <a:rPr lang="en-GB" sz="1100" dirty="0">
+                <a:effectLst/>
+                <a:latin typeface="Calibri" panose="020F0502020204030204" pitchFamily="34" charset="0"/>
+                <a:cs typeface="Calibri" panose="020F0502020204030204" pitchFamily="34" charset="0"/>
+              </a:rPr>
+              <a:t>Cortes-Briones, J. A., Tapia-Rivas, N. I., D’Souza, D. C., &amp; Estevez, P. A. (2021). Going deep into schizophrenia with artificial intelligence. </a:t>
+            </a:r>
+            <a:r>
+              <a:rPr lang="en-GB" sz="1100" i="1" dirty="0">
+                <a:effectLst/>
+                <a:latin typeface="Calibri" panose="020F0502020204030204" pitchFamily="34" charset="0"/>
+                <a:cs typeface="Calibri" panose="020F0502020204030204" pitchFamily="34" charset="0"/>
+              </a:rPr>
+              <a:t>Schizophrenia Research</a:t>
+            </a:r>
+            <a:r>
+              <a:rPr lang="en-GB" sz="1100" dirty="0">
+                <a:effectLst/>
+                <a:latin typeface="Calibri" panose="020F0502020204030204" pitchFamily="34" charset="0"/>
+                <a:cs typeface="Calibri" panose="020F0502020204030204" pitchFamily="34" charset="0"/>
+              </a:rPr>
+              <a:t>. Published. https://doi.org/10.1016/j.schres.2021.05.018</a:t>
+            </a:r>
+          </a:p>
+          <a:p>
+            <a:pPr marL="457200" indent="-457200">
+              <a:lnSpc>
+                <a:spcPct val="200000"/>
+              </a:lnSpc>
+            </a:pPr>
+            <a:endParaRPr lang="en-GB" sz="1100" dirty="0">
+              <a:effectLst/>
+              <a:latin typeface="Calibri" panose="020F0502020204030204" pitchFamily="34" charset="0"/>
+              <a:cs typeface="Calibri" panose="020F0502020204030204" pitchFamily="34" charset="0"/>
+            </a:endParaRPr>
+          </a:p>
+          <a:p>
+            <a:pPr marL="457200" indent="-457200">
+              <a:lnSpc>
+                <a:spcPct val="200000"/>
+              </a:lnSpc>
+            </a:pPr>
+            <a:endParaRPr lang="en-GB" sz="1100" dirty="0">
               <a:effectLst/>
               <a:latin typeface="Calibri" panose="020F0502020204030204" pitchFamily="34" charset="0"/>
               <a:cs typeface="Calibri" panose="020F0502020204030204" pitchFamily="34" charset="0"/>
@@ -5718,17 +6198,28 @@
             <p:ph type="title"/>
           </p:nvPr>
         </p:nvSpPr>
-        <p:spPr/>
+        <p:spPr>
+          <a:xfrm>
+            <a:off x="1069848" y="484632"/>
+            <a:ext cx="10058400" cy="1045230"/>
+          </a:xfrm>
+        </p:spPr>
         <p:txBody>
           <a:bodyPr/>
           <a:lstStyle/>
           <a:p>
             <a:pPr algn="ctr"/>
             <a:r>
-              <a:rPr lang="en-US" dirty="0"/>
+              <a:rPr lang="en-US" dirty="0">
+                <a:latin typeface="Times New Roman" panose="02020603050405020304" pitchFamily="18" charset="0"/>
+                <a:cs typeface="Times New Roman" panose="02020603050405020304" pitchFamily="18" charset="0"/>
+              </a:rPr>
               <a:t>Dataset</a:t>
             </a:r>
-            <a:endParaRPr lang="en-GB" dirty="0"/>
+            <a:endParaRPr lang="en-GB" dirty="0">
+              <a:latin typeface="Times New Roman" panose="02020603050405020304" pitchFamily="18" charset="0"/>
+              <a:cs typeface="Times New Roman" panose="02020603050405020304" pitchFamily="18" charset="0"/>
+            </a:endParaRPr>
           </a:p>
         </p:txBody>
       </p:sp>
@@ -5748,70 +6239,131 @@
             <p:ph idx="1"/>
           </p:nvPr>
         </p:nvSpPr>
-        <p:spPr/>
-        <p:txBody>
-          <a:bodyPr/>
+        <p:spPr>
+          <a:xfrm>
+            <a:off x="1069848" y="1529862"/>
+            <a:ext cx="10058400" cy="4642338"/>
+          </a:xfrm>
+        </p:spPr>
+        <p:txBody>
+          <a:bodyPr>
+            <a:normAutofit/>
+          </a:bodyPr>
           <a:lstStyle/>
           <a:p>
             <a:r>
-              <a:rPr lang="en-US" dirty="0"/>
-              <a:t>Name: </a:t>
-            </a:r>
-            <a:r>
-              <a:rPr lang="en-GB" sz="1800" b="0" i="0" u="none" strike="noStrike" baseline="0" dirty="0"/>
+              <a:rPr lang="en-US" sz="2200" b="1" dirty="0">
+                <a:latin typeface="Calibri" panose="020F0502020204030204" pitchFamily="34" charset="0"/>
+                <a:cs typeface="Calibri" panose="020F0502020204030204" pitchFamily="34" charset="0"/>
+              </a:rPr>
+              <a:t>Name</a:t>
+            </a:r>
+            <a:r>
+              <a:rPr lang="en-US" sz="2200" dirty="0">
+                <a:latin typeface="Calibri" panose="020F0502020204030204" pitchFamily="34" charset="0"/>
+                <a:cs typeface="Calibri" panose="020F0502020204030204" pitchFamily="34" charset="0"/>
+              </a:rPr>
+              <a:t>: </a:t>
+            </a:r>
+            <a:r>
+              <a:rPr lang="en-GB" sz="2200" b="0" i="0" u="none" strike="noStrike" baseline="0" dirty="0">
+                <a:latin typeface="Calibri" panose="020F0502020204030204" pitchFamily="34" charset="0"/>
+                <a:cs typeface="Calibri" panose="020F0502020204030204" pitchFamily="34" charset="0"/>
+              </a:rPr>
               <a:t>Mind Research Network’s Schizophrenia Dataset</a:t>
             </a:r>
-            <a:endParaRPr lang="en-US" dirty="0"/>
-          </a:p>
-          <a:p>
-            <a:r>
-              <a:rPr lang="en-US" dirty="0"/>
-              <a:t>Source: https://www.kaggle.com/c/mlsp-2014-mri</a:t>
-            </a:r>
-          </a:p>
-          <a:p>
-            <a:r>
-              <a:rPr lang="en-US" dirty="0"/>
-              <a:t>This dataset consists of functional connectivity values and source based morphometry loadings </a:t>
-            </a:r>
-          </a:p>
-          <a:p>
-            <a:r>
-              <a:rPr lang="en-US" dirty="0"/>
+            <a:endParaRPr lang="en-US" sz="2200" dirty="0">
+              <a:latin typeface="Calibri" panose="020F0502020204030204" pitchFamily="34" charset="0"/>
+              <a:cs typeface="Calibri" panose="020F0502020204030204" pitchFamily="34" charset="0"/>
+            </a:endParaRPr>
+          </a:p>
+          <a:p>
+            <a:r>
+              <a:rPr lang="en-US" sz="2200" b="1" dirty="0">
+                <a:latin typeface="Calibri" panose="020F0502020204030204" pitchFamily="34" charset="0"/>
+                <a:cs typeface="Calibri" panose="020F0502020204030204" pitchFamily="34" charset="0"/>
+              </a:rPr>
+              <a:t>Source</a:t>
+            </a:r>
+            <a:r>
+              <a:rPr lang="en-US" sz="2200" dirty="0">
+                <a:latin typeface="Calibri" panose="020F0502020204030204" pitchFamily="34" charset="0"/>
+                <a:cs typeface="Calibri" panose="020F0502020204030204" pitchFamily="34" charset="0"/>
+              </a:rPr>
+              <a:t>: https://www.kaggle.com/c/mlsp-2014-mri </a:t>
+            </a:r>
+            <a:r>
+              <a:rPr lang="en-US" sz="2200" b="1" dirty="0">
+                <a:latin typeface="Calibri" panose="020F0502020204030204" pitchFamily="34" charset="0"/>
+                <a:cs typeface="Calibri" panose="020F0502020204030204" pitchFamily="34" charset="0"/>
+              </a:rPr>
+              <a:t>&amp;</a:t>
+            </a:r>
+            <a:r>
+              <a:rPr lang="en-US" sz="2200" dirty="0">
+                <a:latin typeface="Calibri" panose="020F0502020204030204" pitchFamily="34" charset="0"/>
+                <a:cs typeface="Calibri" panose="020F0502020204030204" pitchFamily="34" charset="0"/>
+              </a:rPr>
+              <a:t> http://schizconnect.org/</a:t>
+            </a:r>
+          </a:p>
+          <a:p>
+            <a:r>
+              <a:rPr lang="en-US" sz="2200" dirty="0">
+                <a:latin typeface="Calibri" panose="020F0502020204030204" pitchFamily="34" charset="0"/>
+                <a:cs typeface="Calibri" panose="020F0502020204030204" pitchFamily="34" charset="0"/>
+              </a:rPr>
+              <a:t>This dataset consists of functional connectivity values and source based morphometry loadings, the latter is a collection of similar datasets (request for access pending)</a:t>
+            </a:r>
+          </a:p>
+          <a:p>
+            <a:r>
+              <a:rPr lang="en-US" sz="2200" dirty="0">
+                <a:latin typeface="Calibri" panose="020F0502020204030204" pitchFamily="34" charset="0"/>
+                <a:cs typeface="Calibri" panose="020F0502020204030204" pitchFamily="34" charset="0"/>
+              </a:rPr>
               <a:t>Data format is numeric with column names mapping to each loading in the format of </a:t>
             </a:r>
             <a:r>
-              <a:rPr lang="en-US" dirty="0" err="1"/>
+              <a:rPr lang="en-US" sz="2200" dirty="0" err="1">
+                <a:latin typeface="Calibri" panose="020F0502020204030204" pitchFamily="34" charset="0"/>
+                <a:cs typeface="Calibri" panose="020F0502020204030204" pitchFamily="34" charset="0"/>
+              </a:rPr>
               <a:t>SBM_xx</a:t>
             </a:r>
-            <a:endParaRPr lang="en-US" dirty="0"/>
-          </a:p>
-          <a:p>
-            <a:r>
-              <a:rPr lang="en-US" dirty="0"/>
-              <a:t>Maybe 3 points on the features themselves?</a:t>
-            </a:r>
-          </a:p>
-          <a:p>
-            <a:r>
-              <a:rPr lang="en-US" dirty="0"/>
-              <a:t>A</a:t>
-            </a:r>
-          </a:p>
-          <a:p>
-            <a:r>
-              <a:rPr lang="en-US" dirty="0"/>
-              <a:t>a</a:t>
-            </a:r>
-          </a:p>
-          <a:p>
-            <a:r>
-              <a:rPr lang="en-US" dirty="0"/>
-              <a:t>These are extracted from fMRI and SMRI images</a:t>
-            </a:r>
-          </a:p>
-          <a:p>
-            <a:endParaRPr lang="en-GB" dirty="0"/>
+            <a:r>
+              <a:rPr lang="en-US" sz="2200" dirty="0">
+                <a:latin typeface="Calibri" panose="020F0502020204030204" pitchFamily="34" charset="0"/>
+                <a:cs typeface="Calibri" panose="020F0502020204030204" pitchFamily="34" charset="0"/>
+              </a:rPr>
+              <a:t> or </a:t>
+            </a:r>
+            <a:r>
+              <a:rPr lang="en-US" sz="2200" dirty="0" err="1">
+                <a:latin typeface="Calibri" panose="020F0502020204030204" pitchFamily="34" charset="0"/>
+                <a:cs typeface="Calibri" panose="020F0502020204030204" pitchFamily="34" charset="0"/>
+              </a:rPr>
+              <a:t>FNC_xx</a:t>
+            </a:r>
+            <a:endParaRPr lang="en-US" sz="2200" dirty="0">
+              <a:latin typeface="Calibri" panose="020F0502020204030204" pitchFamily="34" charset="0"/>
+              <a:cs typeface="Calibri" panose="020F0502020204030204" pitchFamily="34" charset="0"/>
+            </a:endParaRPr>
+          </a:p>
+          <a:p>
+            <a:r>
+              <a:rPr lang="en-US" sz="2200" dirty="0">
+                <a:latin typeface="Calibri" panose="020F0502020204030204" pitchFamily="34" charset="0"/>
+                <a:cs typeface="Calibri" panose="020F0502020204030204" pitchFamily="34" charset="0"/>
+              </a:rPr>
+              <a:t>These neuroimaging modalities are extracted from fMRI and sMRI images and are very difficult and time consuming to parse, data like this has to undergo an 8 step cleaning process by an expert before being made available in the format above </a:t>
+            </a:r>
+          </a:p>
+          <a:p>
+            <a:endParaRPr lang="en-GB" sz="2200" dirty="0">
+              <a:latin typeface="Calibri" panose="020F0502020204030204" pitchFamily="34" charset="0"/>
+              <a:cs typeface="Calibri" panose="020F0502020204030204" pitchFamily="34" charset="0"/>
+            </a:endParaRPr>
           </a:p>
         </p:txBody>
       </p:sp>

</xml_diff>